<commit_message>
flow chart image correction
</commit_message>
<xml_diff>
--- a/presentation slides/CS613-FinalProject-Presentation.pptx
+++ b/presentation slides/CS613-FinalProject-Presentation.pptx
@@ -9098,7 +9098,7 @@
       </p:sp>
       <p:pic>
         <p:nvPicPr>
-          <p:cNvPr id="5" name="Picture 4" descr="A diagram of data processing&#10;&#10;Description automatically generated with low confidence">
+          <p:cNvPr id="5" name="Picture 4">
             <a:extLst>
               <a:ext uri="{FF2B5EF4-FFF2-40B4-BE49-F238E27FC236}">
                 <a16:creationId xmlns:a16="http://schemas.microsoft.com/office/drawing/2014/main" id="{DCDBE516-BC5B-4D8E-F7AD-1126C4A5B57D}"/>
@@ -9110,9 +9110,9 @@
           </p:cNvPicPr>
           <p:nvPr/>
         </p:nvPicPr>
-        <p:blipFill rotWithShape="1">
+        <p:blipFill>
           <a:blip r:embed="rId2"/>
-          <a:srcRect r="3244" b="2"/>
+          <a:srcRect l="2075" r="2075"/>
           <a:stretch/>
         </p:blipFill>
         <p:spPr>

</xml_diff>

<commit_message>
updated neural network slides
</commit_message>
<xml_diff>
--- a/presentation slides/CS613-FinalProject-Presentation.pptx
+++ b/presentation slides/CS613-FinalProject-Presentation.pptx
@@ -5,7 +5,7 @@
     <p:sldMasterId id="2147483648" r:id="rId1"/>
   </p:sldMasterIdLst>
   <p:notesMasterIdLst>
-    <p:notesMasterId r:id="rId18"/>
+    <p:notesMasterId r:id="rId19"/>
   </p:notesMasterIdLst>
   <p:sldIdLst>
     <p:sldId id="256" r:id="rId2"/>
@@ -16,14 +16,15 @@
     <p:sldId id="284" r:id="rId7"/>
     <p:sldId id="287" r:id="rId8"/>
     <p:sldId id="286" r:id="rId9"/>
-    <p:sldId id="268" r:id="rId10"/>
-    <p:sldId id="278" r:id="rId11"/>
-    <p:sldId id="279" r:id="rId12"/>
-    <p:sldId id="280" r:id="rId13"/>
-    <p:sldId id="262" r:id="rId14"/>
-    <p:sldId id="265" r:id="rId15"/>
-    <p:sldId id="270" r:id="rId16"/>
-    <p:sldId id="271" r:id="rId17"/>
+    <p:sldId id="288" r:id="rId10"/>
+    <p:sldId id="268" r:id="rId11"/>
+    <p:sldId id="278" r:id="rId12"/>
+    <p:sldId id="279" r:id="rId13"/>
+    <p:sldId id="280" r:id="rId14"/>
+    <p:sldId id="262" r:id="rId15"/>
+    <p:sldId id="265" r:id="rId16"/>
+    <p:sldId id="270" r:id="rId17"/>
+    <p:sldId id="271" r:id="rId18"/>
   </p:sldIdLst>
   <p:sldSz cx="12192000" cy="6858000"/>
   <p:notesSz cx="6858000" cy="9144000"/>
@@ -212,7 +213,7 @@
           <a:p>
             <a:fld id="{554293D9-CEF4-E549-8C2B-4C1F408488E2}" type="datetimeFigureOut">
               <a:rPr lang="en-US" smtClean="0"/>
-              <a:t>6/13/23</a:t>
+              <a:t>6/15/23</a:t>
             </a:fld>
             <a:endParaRPr lang="en-US"/>
           </a:p>
@@ -712,7 +713,7 @@
           <a:p>
             <a:fld id="{941248EB-719A-B944-B3C9-708649C4FE49}" type="slidenum">
               <a:rPr lang="en-US" smtClean="0"/>
-              <a:t>9</a:t>
+              <a:t>10</a:t>
             </a:fld>
             <a:endParaRPr lang="en-US"/>
           </a:p>
@@ -878,7 +879,7 @@
           <a:p>
             <a:fld id="{3C5E3940-567D-0E4A-B27A-538E5CA3F251}" type="datetimeFigureOut">
               <a:rPr lang="en-US" smtClean="0"/>
-              <a:t>6/13/23</a:t>
+              <a:t>6/15/23</a:t>
             </a:fld>
             <a:endParaRPr lang="en-US"/>
           </a:p>
@@ -1076,7 +1077,7 @@
           <a:p>
             <a:fld id="{3C5E3940-567D-0E4A-B27A-538E5CA3F251}" type="datetimeFigureOut">
               <a:rPr lang="en-US" smtClean="0"/>
-              <a:t>6/13/23</a:t>
+              <a:t>6/15/23</a:t>
             </a:fld>
             <a:endParaRPr lang="en-US"/>
           </a:p>
@@ -1284,7 +1285,7 @@
           <a:p>
             <a:fld id="{3C5E3940-567D-0E4A-B27A-538E5CA3F251}" type="datetimeFigureOut">
               <a:rPr lang="en-US" smtClean="0"/>
-              <a:t>6/13/23</a:t>
+              <a:t>6/15/23</a:t>
             </a:fld>
             <a:endParaRPr lang="en-US"/>
           </a:p>
@@ -1482,7 +1483,7 @@
           <a:p>
             <a:fld id="{3C5E3940-567D-0E4A-B27A-538E5CA3F251}" type="datetimeFigureOut">
               <a:rPr lang="en-US" smtClean="0"/>
-              <a:t>6/13/23</a:t>
+              <a:t>6/15/23</a:t>
             </a:fld>
             <a:endParaRPr lang="en-US"/>
           </a:p>
@@ -1757,7 +1758,7 @@
           <a:p>
             <a:fld id="{3C5E3940-567D-0E4A-B27A-538E5CA3F251}" type="datetimeFigureOut">
               <a:rPr lang="en-US" smtClean="0"/>
-              <a:t>6/13/23</a:t>
+              <a:t>6/15/23</a:t>
             </a:fld>
             <a:endParaRPr lang="en-US"/>
           </a:p>
@@ -2022,7 +2023,7 @@
           <a:p>
             <a:fld id="{3C5E3940-567D-0E4A-B27A-538E5CA3F251}" type="datetimeFigureOut">
               <a:rPr lang="en-US" smtClean="0"/>
-              <a:t>6/13/23</a:t>
+              <a:t>6/15/23</a:t>
             </a:fld>
             <a:endParaRPr lang="en-US"/>
           </a:p>
@@ -2434,7 +2435,7 @@
           <a:p>
             <a:fld id="{3C5E3940-567D-0E4A-B27A-538E5CA3F251}" type="datetimeFigureOut">
               <a:rPr lang="en-US" smtClean="0"/>
-              <a:t>6/13/23</a:t>
+              <a:t>6/15/23</a:t>
             </a:fld>
             <a:endParaRPr lang="en-US"/>
           </a:p>
@@ -2575,7 +2576,7 @@
           <a:p>
             <a:fld id="{3C5E3940-567D-0E4A-B27A-538E5CA3F251}" type="datetimeFigureOut">
               <a:rPr lang="en-US" smtClean="0"/>
-              <a:t>6/13/23</a:t>
+              <a:t>6/15/23</a:t>
             </a:fld>
             <a:endParaRPr lang="en-US"/>
           </a:p>
@@ -2688,7 +2689,7 @@
           <a:p>
             <a:fld id="{3C5E3940-567D-0E4A-B27A-538E5CA3F251}" type="datetimeFigureOut">
               <a:rPr lang="en-US" smtClean="0"/>
-              <a:t>6/13/23</a:t>
+              <a:t>6/15/23</a:t>
             </a:fld>
             <a:endParaRPr lang="en-US"/>
           </a:p>
@@ -2999,7 +3000,7 @@
           <a:p>
             <a:fld id="{3C5E3940-567D-0E4A-B27A-538E5CA3F251}" type="datetimeFigureOut">
               <a:rPr lang="en-US" smtClean="0"/>
-              <a:t>6/13/23</a:t>
+              <a:t>6/15/23</a:t>
             </a:fld>
             <a:endParaRPr lang="en-US"/>
           </a:p>
@@ -3287,7 +3288,7 @@
           <a:p>
             <a:fld id="{3C5E3940-567D-0E4A-B27A-538E5CA3F251}" type="datetimeFigureOut">
               <a:rPr lang="en-US" smtClean="0"/>
-              <a:t>6/13/23</a:t>
+              <a:t>6/15/23</a:t>
             </a:fld>
             <a:endParaRPr lang="en-US"/>
           </a:p>
@@ -3528,7 +3529,7 @@
           <a:p>
             <a:fld id="{3C5E3940-567D-0E4A-B27A-538E5CA3F251}" type="datetimeFigureOut">
               <a:rPr lang="en-US" smtClean="0"/>
-              <a:t>6/13/23</a:t>
+              <a:t>6/15/23</a:t>
             </a:fld>
             <a:endParaRPr lang="en-US"/>
           </a:p>
@@ -4486,10 +4487,10 @@
       </p:grpSpPr>
       <p:sp useBgFill="1">
         <p:nvSpPr>
-          <p:cNvPr id="8" name="Rectangle 7">
-            <a:extLst>
-              <a:ext uri="{FF2B5EF4-FFF2-40B4-BE49-F238E27FC236}">
-                <a16:creationId xmlns:a16="http://schemas.microsoft.com/office/drawing/2014/main" id="{979E27D9-03C7-44E2-9FF8-15D0C8506AF7}"/>
+          <p:cNvPr id="10" name="Rectangle 9">
+            <a:extLst>
+              <a:ext uri="{FF2B5EF4-FFF2-40B4-BE49-F238E27FC236}">
+                <a16:creationId xmlns:a16="http://schemas.microsoft.com/office/drawing/2014/main" id="{3346177D-ADC4-4968-B747-5CFCD390B5B9}"/>
               </a:ext>
               <a:ext uri="{C183D7F6-B498-43B3-948B-1728B52AA6E4}">
                 <adec:decorative xmlns:adec="http://schemas.microsoft.com/office/drawing/2017/decorative" val="1"/>
@@ -4565,7 +4566,7 @@
           <p:cNvPr id="2" name="Title 1">
             <a:extLst>
               <a:ext uri="{FF2B5EF4-FFF2-40B4-BE49-F238E27FC236}">
-                <a16:creationId xmlns:a16="http://schemas.microsoft.com/office/drawing/2014/main" id="{5C4F02F6-349D-954F-B02F-78EBD3017252}"/>
+                <a16:creationId xmlns:a16="http://schemas.microsoft.com/office/drawing/2014/main" id="{1518A51C-AC5C-224B-83E1-BE4285E72E3E}"/>
               </a:ext>
             </a:extLst>
           </p:cNvPr>
@@ -4578,8 +4579,8 @@
         </p:nvSpPr>
         <p:spPr>
           <a:xfrm>
-            <a:off x="1136397" y="502022"/>
-            <a:ext cx="9688296" cy="1388356"/>
+            <a:off x="5596501" y="489509"/>
+            <a:ext cx="5754896" cy="785562"/>
           </a:xfrm>
         </p:spPr>
         <p:txBody>
@@ -4590,31 +4591,68 @@
           <a:p>
             <a:r>
               <a:rPr lang="en-US" sz="4000" b="1" dirty="0"/>
-              <a:t>Heart Failure Prediction Dataset structure</a:t>
-            </a:r>
-          </a:p>
-        </p:txBody>
-      </p:sp>
-      <p:sp>
-        <p:nvSpPr>
-          <p:cNvPr id="3" name="Content Placeholder 2">
-            <a:extLst>
-              <a:ext uri="{FF2B5EF4-FFF2-40B4-BE49-F238E27FC236}">
-                <a16:creationId xmlns:a16="http://schemas.microsoft.com/office/drawing/2014/main" id="{3A721E59-1DC4-3845-9DB3-10F69E64143F}"/>
-              </a:ext>
-            </a:extLst>
-          </p:cNvPr>
-          <p:cNvSpPr>
-            <a:spLocks noGrp="1"/>
-          </p:cNvSpPr>
-          <p:nvPr>
-            <p:ph idx="1"/>
-          </p:nvPr>
-        </p:nvSpPr>
+              <a:t>Source of Data: </a:t>
+            </a:r>
+            <a:r>
+              <a:rPr lang="en-US" sz="4000" b="1" dirty="0">
+                <a:solidFill>
+                  <a:srgbClr val="00B0F0"/>
+                </a:solidFill>
+              </a:rPr>
+              <a:t>Kaggle</a:t>
+            </a:r>
+          </a:p>
+        </p:txBody>
+      </p:sp>
+      <p:pic>
+        <p:nvPicPr>
+          <p:cNvPr id="5" name="Picture 4">
+            <a:extLst>
+              <a:ext uri="{FF2B5EF4-FFF2-40B4-BE49-F238E27FC236}">
+                <a16:creationId xmlns:a16="http://schemas.microsoft.com/office/drawing/2014/main" id="{5656DBCB-4246-3424-8BF4-9B7FD47CD472}"/>
+              </a:ext>
+            </a:extLst>
+          </p:cNvPr>
+          <p:cNvPicPr>
+            <a:picLocks noChangeAspect="1"/>
+          </p:cNvPicPr>
+          <p:nvPr/>
+        </p:nvPicPr>
+        <p:blipFill>
+          <a:blip r:embed="rId3"/>
+          <a:srcRect/>
+          <a:stretch/>
+        </p:blipFill>
         <p:spPr>
           <a:xfrm>
-            <a:off x="1136397" y="2270234"/>
-            <a:ext cx="9688296" cy="3773213"/>
+            <a:off x="1068130" y="2332206"/>
+            <a:ext cx="3876165" cy="1761893"/>
+          </a:xfrm>
+          <a:prstGeom prst="rect">
+            <a:avLst/>
+          </a:prstGeom>
+        </p:spPr>
+      </p:pic>
+      <p:sp>
+        <p:nvSpPr>
+          <p:cNvPr id="3" name="Content Placeholder 2">
+            <a:extLst>
+              <a:ext uri="{FF2B5EF4-FFF2-40B4-BE49-F238E27FC236}">
+                <a16:creationId xmlns:a16="http://schemas.microsoft.com/office/drawing/2014/main" id="{69AB92F3-2775-4B46-A098-FE988824A88C}"/>
+              </a:ext>
+            </a:extLst>
+          </p:cNvPr>
+          <p:cNvSpPr>
+            <a:spLocks noGrp="1"/>
+          </p:cNvSpPr>
+          <p:nvPr>
+            <p:ph idx="1"/>
+          </p:nvPr>
+        </p:nvSpPr>
+        <p:spPr>
+          <a:xfrm>
+            <a:off x="5596502" y="1537855"/>
+            <a:ext cx="5930480" cy="4599709"/>
           </a:xfrm>
         </p:spPr>
         <p:txBody>
@@ -4627,197 +4665,140 @@
               <a:buNone/>
             </a:pPr>
             <a:r>
-              <a:rPr lang="en-US" sz="1900" b="1" dirty="0"/>
-              <a:t>Age</a:t>
-            </a:r>
-            <a:r>
-              <a:rPr lang="en-US" sz="1900" dirty="0"/>
-              <a:t>: age of the patient [years]</a:t>
+              <a:rPr lang="en-US" sz="2800" dirty="0"/>
+              <a:t>The </a:t>
+            </a:r>
+            <a:r>
+              <a:rPr lang="en-US" b="1" dirty="0"/>
+              <a:t>Heart Failure Prediction Dataset </a:t>
+            </a:r>
+            <a:r>
+              <a:rPr lang="en-US" sz="2800" dirty="0"/>
+              <a:t>dataset was created by combining different datasets already available independently but not combined before. In this dataset, 5 heart datasets are combined over 11 common features which makes it the largest heart disease dataset available so far for research purposes. The five datasets used for its curation are:</a:t>
             </a:r>
           </a:p>
           <a:p>
             <a:pPr marL="0" indent="0">
               <a:buNone/>
             </a:pPr>
-            <a:r>
-              <a:rPr lang="en-US" sz="1900" b="1" dirty="0"/>
-              <a:t>Sex</a:t>
-            </a:r>
-            <a:r>
-              <a:rPr lang="en-US" sz="1900" dirty="0"/>
-              <a:t>: sex of the patient [M: Male, F: Female]</a:t>
+            <a:endParaRPr lang="en-US" sz="1000" dirty="0"/>
+          </a:p>
+          <a:p>
+            <a:pPr>
+              <a:buFont typeface="Arial" panose="020B0604020202020204" pitchFamily="34" charset="0"/>
+              <a:buChar char="•"/>
+            </a:pPr>
+            <a:r>
+              <a:rPr lang="en-US" sz="2000" i="1" dirty="0"/>
+              <a:t>Cleveland</a:t>
+            </a:r>
+            <a:r>
+              <a:rPr lang="en-US" sz="2000" dirty="0"/>
+              <a:t>: 303 observations</a:t>
+            </a:r>
+          </a:p>
+          <a:p>
+            <a:pPr>
+              <a:buFont typeface="Arial" panose="020B0604020202020204" pitchFamily="34" charset="0"/>
+              <a:buChar char="•"/>
+            </a:pPr>
+            <a:r>
+              <a:rPr lang="en-US" sz="2000" i="1" dirty="0"/>
+              <a:t>Hungarian</a:t>
+            </a:r>
+            <a:r>
+              <a:rPr lang="en-US" sz="2000" dirty="0"/>
+              <a:t>: 294 observations</a:t>
+            </a:r>
+          </a:p>
+          <a:p>
+            <a:pPr>
+              <a:buFont typeface="Arial" panose="020B0604020202020204" pitchFamily="34" charset="0"/>
+              <a:buChar char="•"/>
+            </a:pPr>
+            <a:r>
+              <a:rPr lang="en-US" sz="2000" i="1" dirty="0"/>
+              <a:t>Switzerland</a:t>
+            </a:r>
+            <a:r>
+              <a:rPr lang="en-US" sz="2000" dirty="0"/>
+              <a:t>: 123 observations</a:t>
+            </a:r>
+          </a:p>
+          <a:p>
+            <a:pPr>
+              <a:buFont typeface="Arial" panose="020B0604020202020204" pitchFamily="34" charset="0"/>
+              <a:buChar char="•"/>
+            </a:pPr>
+            <a:r>
+              <a:rPr lang="en-US" sz="2000" i="1" dirty="0"/>
+              <a:t>Long Beach VA</a:t>
+            </a:r>
+            <a:r>
+              <a:rPr lang="en-US" sz="2000" dirty="0"/>
+              <a:t>: 200 observations</a:t>
+            </a:r>
+          </a:p>
+          <a:p>
+            <a:pPr>
+              <a:buFont typeface="Arial" panose="020B0604020202020204" pitchFamily="34" charset="0"/>
+              <a:buChar char="•"/>
+            </a:pPr>
+            <a:r>
+              <a:rPr lang="en-US" sz="2000" i="1" dirty="0" err="1"/>
+              <a:t>Stalog</a:t>
+            </a:r>
+            <a:r>
+              <a:rPr lang="en-US" sz="2000" i="1" dirty="0"/>
+              <a:t> (Heart) Data Set</a:t>
+            </a:r>
+            <a:r>
+              <a:rPr lang="en-US" sz="2000" dirty="0"/>
+              <a:t>: 270 observations</a:t>
             </a:r>
           </a:p>
           <a:p>
             <a:pPr marL="0" indent="0">
               <a:buNone/>
             </a:pPr>
-            <a:r>
-              <a:rPr lang="en-US" sz="1900" b="1" dirty="0" err="1"/>
-              <a:t>ChestPainType</a:t>
-            </a:r>
-            <a:r>
-              <a:rPr lang="en-US" sz="1900" dirty="0"/>
-              <a:t>: chest pain type [TA: Typical Angina, ATA: Atypical Angina, NAP: Non-Anginal Pain, ASY: Asymptomatic]</a:t>
-            </a:r>
+            <a:endParaRPr lang="en-US" sz="1000" dirty="0"/>
           </a:p>
           <a:p>
             <a:pPr marL="0" indent="0">
               <a:buNone/>
             </a:pPr>
             <a:r>
-              <a:rPr lang="en-US" sz="1900" b="1" dirty="0" err="1"/>
-              <a:t>RestingBP</a:t>
-            </a:r>
-            <a:r>
-              <a:rPr lang="en-US" sz="1900" dirty="0"/>
-              <a:t>: resting blood pressure [mm Hg]</a:t>
-            </a:r>
+              <a:rPr lang="en-US" sz="1200" dirty="0"/>
+              <a:t>Every dataset used can be found under the Index of heart disease datasets from UCI Machine Learning Repository on the following link: </a:t>
+            </a:r>
+            <a:r>
+              <a:rPr lang="en-US" sz="1200" dirty="0">
+                <a:hlinkClick r:id="rId4"/>
+              </a:rPr>
+              <a:t>https://archive.ics.uci.edu/ml/machine-learning-databases/heart-disease/</a:t>
+            </a:r>
+            <a:endParaRPr lang="en-US" sz="1200" dirty="0"/>
           </a:p>
           <a:p>
             <a:pPr marL="0" indent="0">
               <a:buNone/>
             </a:pPr>
             <a:r>
-              <a:rPr lang="en-US" sz="1900" b="1" dirty="0"/>
-              <a:t>Cholesterol</a:t>
-            </a:r>
-            <a:r>
-              <a:rPr lang="en-US" sz="1900" dirty="0"/>
-              <a:t>: serum cholesterol [mm/dl]</a:t>
-            </a:r>
-          </a:p>
-          <a:p>
-            <a:pPr marL="0" indent="0">
-              <a:buNone/>
-            </a:pPr>
-            <a:r>
-              <a:rPr lang="en-US" sz="1900" b="1" dirty="0" err="1"/>
-              <a:t>FastingBS</a:t>
-            </a:r>
-            <a:r>
-              <a:rPr lang="en-US" sz="1900" dirty="0"/>
-              <a:t>: fasting blood sugar [1: if </a:t>
-            </a:r>
-            <a:r>
-              <a:rPr lang="en-US" sz="1900" dirty="0" err="1"/>
-              <a:t>FastingBS</a:t>
-            </a:r>
-            <a:r>
-              <a:rPr lang="en-US" sz="1900" dirty="0"/>
-              <a:t> &gt; 120 mg/dl, 0: otherwise]</a:t>
-            </a:r>
-          </a:p>
-          <a:p>
-            <a:pPr marL="0" indent="0">
-              <a:buNone/>
-            </a:pPr>
-            <a:r>
-              <a:rPr lang="en-US" sz="1900" b="1" dirty="0" err="1"/>
-              <a:t>RestingECG</a:t>
-            </a:r>
-            <a:r>
-              <a:rPr lang="en-US" sz="1900" dirty="0"/>
-              <a:t>: resting electrocardiogram results [Normal: Normal, ST: having ST-T wave abnormality (T wave inversions and/or ST elevation or depression of &gt; 0.05 mV), LVH: showing probable or definite left ventricular hypertrophy by Estes' criteria]</a:t>
-            </a:r>
-          </a:p>
-          <a:p>
-            <a:pPr marL="0" indent="0">
-              <a:buNone/>
-            </a:pPr>
-            <a:r>
-              <a:rPr lang="en-US" sz="1900" b="1" dirty="0" err="1"/>
-              <a:t>MaxHR</a:t>
-            </a:r>
-            <a:r>
-              <a:rPr lang="en-US" sz="1900" dirty="0"/>
-              <a:t>: maximum heart rate achieved [Numeric value between 60 and 202]</a:t>
-            </a:r>
-          </a:p>
-          <a:p>
-            <a:pPr marL="0" indent="0">
-              <a:buNone/>
-            </a:pPr>
-            <a:r>
-              <a:rPr lang="en-US" sz="1900" b="1" dirty="0" err="1"/>
-              <a:t>ExerciseAngina</a:t>
-            </a:r>
-            <a:r>
-              <a:rPr lang="en-US" sz="1900" dirty="0"/>
-              <a:t>: exercise-induced angina [Y: Yes, N: No]</a:t>
-            </a:r>
-          </a:p>
-          <a:p>
-            <a:pPr marL="0" indent="0">
-              <a:buNone/>
-            </a:pPr>
-            <a:r>
-              <a:rPr lang="en-US" sz="1900" b="1" dirty="0" err="1"/>
-              <a:t>Oldpeak</a:t>
-            </a:r>
-            <a:r>
-              <a:rPr lang="en-US" sz="1900" dirty="0"/>
-              <a:t>: </a:t>
-            </a:r>
-            <a:r>
-              <a:rPr lang="en-US" sz="1900" dirty="0" err="1"/>
-              <a:t>oldpeak</a:t>
-            </a:r>
-            <a:r>
-              <a:rPr lang="en-US" sz="1900" dirty="0"/>
-              <a:t> = ST [Numeric value measured in depression]</a:t>
-            </a:r>
-          </a:p>
-          <a:p>
-            <a:pPr marL="0" indent="0">
-              <a:buNone/>
-            </a:pPr>
-            <a:r>
-              <a:rPr lang="en-US" sz="1900" b="1" dirty="0" err="1"/>
-              <a:t>ST_Slope</a:t>
-            </a:r>
-            <a:r>
-              <a:rPr lang="en-US" sz="1900" dirty="0"/>
-              <a:t>: the slope of the peak exercise ST segment [Up: upsloping, Flat: flat, Down: </a:t>
-            </a:r>
-            <a:r>
-              <a:rPr lang="en-US" sz="1900" dirty="0" err="1"/>
-              <a:t>downsloping</a:t>
-            </a:r>
-            <a:r>
-              <a:rPr lang="en-US" sz="1900" dirty="0"/>
-              <a:t>]</a:t>
-            </a:r>
-          </a:p>
-          <a:p>
-            <a:pPr marL="0" indent="0">
-              <a:buNone/>
-            </a:pPr>
-            <a:r>
-              <a:rPr lang="en-US" sz="1900" b="1" dirty="0" err="1"/>
-              <a:t>HeartDisease</a:t>
-            </a:r>
-            <a:r>
-              <a:rPr lang="en-US" sz="1900" dirty="0"/>
-              <a:t>: output class [1: heart disease, 0: Normal]</a:t>
-            </a:r>
-          </a:p>
-          <a:p>
-            <a:pPr marL="457200" lvl="1" indent="0">
-              <a:buNone/>
-            </a:pPr>
-            <a:endParaRPr lang="en-US" sz="2000" dirty="0">
-              <a:effectLst/>
-            </a:endParaRPr>
-          </a:p>
-        </p:txBody>
-      </p:sp>
-      <p:sp>
-        <p:nvSpPr>
-          <p:cNvPr id="10" name="Rectangle 9">
-            <a:extLst>
-              <a:ext uri="{FF2B5EF4-FFF2-40B4-BE49-F238E27FC236}">
-                <a16:creationId xmlns:a16="http://schemas.microsoft.com/office/drawing/2014/main" id="{EEBF1590-3B36-48EE-A89D-3B6F3CB256AB}"/>
+              <a:rPr lang="en-US" sz="1200" dirty="0">
+                <a:hlinkClick r:id="rId5"/>
+              </a:rPr>
+              <a:t>https://www.kaggle.com/datasets/fedesoriano/heart-failure-prediction</a:t>
+            </a:r>
+            <a:endParaRPr lang="en-US" sz="1200" dirty="0"/>
+          </a:p>
+        </p:txBody>
+      </p:sp>
+      <p:sp>
+        <p:nvSpPr>
+          <p:cNvPr id="12" name="Rectangle 11">
+            <a:extLst>
+              <a:ext uri="{FF2B5EF4-FFF2-40B4-BE49-F238E27FC236}">
+                <a16:creationId xmlns:a16="http://schemas.microsoft.com/office/drawing/2014/main" id="{0844A943-BF79-4FEA-ABB1-3BD54D236606}"/>
               </a:ext>
               <a:ext uri="{C183D7F6-B498-43B3-948B-1728B52AA6E4}">
                 <adec:decorative xmlns:adec="http://schemas.microsoft.com/office/drawing/2017/decorative" val="1"/>
@@ -4848,7 +4829,7 @@
               <a:gs pos="0">
                 <a:schemeClr val="accent1"/>
               </a:gs>
-              <a:gs pos="78000">
+              <a:gs pos="90000">
                 <a:srgbClr val="000000"/>
               </a:gs>
             </a:gsLst>
@@ -4885,10 +4866,10 @@
       </p:sp>
       <p:sp>
         <p:nvSpPr>
-          <p:cNvPr id="12" name="Rectangle 11">
-            <a:extLst>
-              <a:ext uri="{FF2B5EF4-FFF2-40B4-BE49-F238E27FC236}">
-                <a16:creationId xmlns:a16="http://schemas.microsoft.com/office/drawing/2014/main" id="{AC8F6C8C-AB5A-4548-942D-E3FD40ACBC49}"/>
+          <p:cNvPr id="14" name="Rectangle 13">
+            <a:extLst>
+              <a:ext uri="{FF2B5EF4-FFF2-40B4-BE49-F238E27FC236}">
+                <a16:creationId xmlns:a16="http://schemas.microsoft.com/office/drawing/2014/main" id="{6437CC72-F4A8-4DC3-AFAB-D22C482C8100}"/>
               </a:ext>
               <a:ext uri="{C183D7F6-B498-43B3-948B-1728B52AA6E4}">
                 <adec:decorative xmlns:adec="http://schemas.microsoft.com/office/drawing/2017/decorative" val="1"/>
@@ -4918,7 +4899,7 @@
             <a:gsLst>
               <a:gs pos="0">
                 <a:srgbClr val="000000">
-                  <a:alpha val="63000"/>
+                  <a:alpha val="50000"/>
                 </a:srgbClr>
               </a:gs>
               <a:gs pos="100000">
@@ -4961,7 +4942,7 @@
     </p:spTree>
     <p:extLst>
       <p:ext uri="{BB962C8B-B14F-4D97-AF65-F5344CB8AC3E}">
-        <p14:creationId xmlns:p14="http://schemas.microsoft.com/office/powerpoint/2010/main" val="946419350"/>
+        <p14:creationId xmlns:p14="http://schemas.microsoft.com/office/powerpoint/2010/main" val="3001573324"/>
       </p:ext>
     </p:extLst>
   </p:cSld>
@@ -5101,10 +5082,9 @@
           <a:lstStyle/>
           <a:p>
             <a:r>
-              <a:rPr lang="en-US" sz="4000" b="1"/>
-              <a:t>Results and Observations</a:t>
-            </a:r>
-            <a:endParaRPr lang="en-US" sz="4000" b="1" dirty="0"/>
+              <a:rPr lang="en-US" sz="4000" b="1" dirty="0"/>
+              <a:t>Heart Failure Prediction Dataset structure</a:t>
+            </a:r>
           </a:p>
         </p:txBody>
       </p:sp>
@@ -5126,25 +5106,202 @@
         </p:nvSpPr>
         <p:spPr>
           <a:xfrm>
-            <a:off x="1136397" y="2418409"/>
-            <a:ext cx="9688296" cy="3782694"/>
+            <a:off x="1136397" y="2270234"/>
+            <a:ext cx="9688296" cy="3773213"/>
           </a:xfrm>
         </p:spPr>
         <p:txBody>
           <a:bodyPr anchor="t">
-            <a:normAutofit/>
+            <a:normAutofit fontScale="77500" lnSpcReduction="20000"/>
           </a:bodyPr>
           <a:lstStyle/>
           <a:p>
+            <a:pPr marL="0" indent="0">
+              <a:buNone/>
+            </a:pPr>
+            <a:r>
+              <a:rPr lang="en-US" sz="1900" b="1" dirty="0"/>
+              <a:t>Age</a:t>
+            </a:r>
+            <a:r>
+              <a:rPr lang="en-US" sz="1900" dirty="0"/>
+              <a:t>: age of the patient [years]</a:t>
+            </a:r>
+          </a:p>
+          <a:p>
+            <a:pPr marL="0" indent="0">
+              <a:buNone/>
+            </a:pPr>
+            <a:r>
+              <a:rPr lang="en-US" sz="1900" b="1" dirty="0"/>
+              <a:t>Sex</a:t>
+            </a:r>
+            <a:r>
+              <a:rPr lang="en-US" sz="1900" dirty="0"/>
+              <a:t>: sex of the patient [M: Male, F: Female]</a:t>
+            </a:r>
+          </a:p>
+          <a:p>
+            <a:pPr marL="0" indent="0">
+              <a:buNone/>
+            </a:pPr>
+            <a:r>
+              <a:rPr lang="en-US" sz="1900" b="1" dirty="0" err="1"/>
+              <a:t>ChestPainType</a:t>
+            </a:r>
+            <a:r>
+              <a:rPr lang="en-US" sz="1900" dirty="0"/>
+              <a:t>: chest pain type [TA: Typical Angina, ATA: Atypical Angina, NAP: Non-Anginal Pain, ASY: Asymptomatic]</a:t>
+            </a:r>
+          </a:p>
+          <a:p>
+            <a:pPr marL="0" indent="0">
+              <a:buNone/>
+            </a:pPr>
+            <a:r>
+              <a:rPr lang="en-US" sz="1900" b="1" dirty="0" err="1"/>
+              <a:t>RestingBP</a:t>
+            </a:r>
+            <a:r>
+              <a:rPr lang="en-US" sz="1900" dirty="0"/>
+              <a:t>: resting blood pressure [mm Hg]</a:t>
+            </a:r>
+          </a:p>
+          <a:p>
+            <a:pPr marL="0" indent="0">
+              <a:buNone/>
+            </a:pPr>
+            <a:r>
+              <a:rPr lang="en-US" sz="1900" b="1" dirty="0"/>
+              <a:t>Cholesterol</a:t>
+            </a:r>
+            <a:r>
+              <a:rPr lang="en-US" sz="1900" dirty="0"/>
+              <a:t>: serum cholesterol [mm/dl]</a:t>
+            </a:r>
+          </a:p>
+          <a:p>
+            <a:pPr marL="0" indent="0">
+              <a:buNone/>
+            </a:pPr>
+            <a:r>
+              <a:rPr lang="en-US" sz="1900" b="1" dirty="0" err="1"/>
+              <a:t>FastingBS</a:t>
+            </a:r>
+            <a:r>
+              <a:rPr lang="en-US" sz="1900" dirty="0"/>
+              <a:t>: fasting blood sugar [1: if </a:t>
+            </a:r>
+            <a:r>
+              <a:rPr lang="en-US" sz="1900" dirty="0" err="1"/>
+              <a:t>FastingBS</a:t>
+            </a:r>
+            <a:r>
+              <a:rPr lang="en-US" sz="1900" dirty="0"/>
+              <a:t> &gt; 120 mg/dl, 0: otherwise]</a:t>
+            </a:r>
+          </a:p>
+          <a:p>
+            <a:pPr marL="0" indent="0">
+              <a:buNone/>
+            </a:pPr>
+            <a:r>
+              <a:rPr lang="en-US" sz="1900" b="1" dirty="0" err="1"/>
+              <a:t>RestingECG</a:t>
+            </a:r>
+            <a:r>
+              <a:rPr lang="en-US" sz="1900" dirty="0"/>
+              <a:t>: resting electrocardiogram results [Normal: Normal, ST: having ST-T wave abnormality (T wave inversions and/or ST elevation or depression of &gt; 0.05 mV), LVH: showing probable or definite left ventricular hypertrophy by Estes' criteria]</a:t>
+            </a:r>
+          </a:p>
+          <a:p>
+            <a:pPr marL="0" indent="0">
+              <a:buNone/>
+            </a:pPr>
+            <a:r>
+              <a:rPr lang="en-US" sz="1900" b="1" dirty="0" err="1"/>
+              <a:t>MaxHR</a:t>
+            </a:r>
+            <a:r>
+              <a:rPr lang="en-US" sz="1900" dirty="0"/>
+              <a:t>: maximum heart rate achieved [Numeric value between 60 and 202]</a:t>
+            </a:r>
+          </a:p>
+          <a:p>
+            <a:pPr marL="0" indent="0">
+              <a:buNone/>
+            </a:pPr>
+            <a:r>
+              <a:rPr lang="en-US" sz="1900" b="1" dirty="0" err="1"/>
+              <a:t>ExerciseAngina</a:t>
+            </a:r>
+            <a:r>
+              <a:rPr lang="en-US" sz="1900" dirty="0"/>
+              <a:t>: exercise-induced angina [Y: Yes, N: No]</a:t>
+            </a:r>
+          </a:p>
+          <a:p>
+            <a:pPr marL="0" indent="0">
+              <a:buNone/>
+            </a:pPr>
+            <a:r>
+              <a:rPr lang="en-US" sz="1900" b="1" dirty="0" err="1"/>
+              <a:t>Oldpeak</a:t>
+            </a:r>
+            <a:r>
+              <a:rPr lang="en-US" sz="1900" dirty="0"/>
+              <a:t>: </a:t>
+            </a:r>
+            <a:r>
+              <a:rPr lang="en-US" sz="1900" dirty="0" err="1"/>
+              <a:t>oldpeak</a:t>
+            </a:r>
+            <a:r>
+              <a:rPr lang="en-US" sz="1900" dirty="0"/>
+              <a:t> = ST [Numeric value measured in depression]</a:t>
+            </a:r>
+          </a:p>
+          <a:p>
+            <a:pPr marL="0" indent="0">
+              <a:buNone/>
+            </a:pPr>
+            <a:r>
+              <a:rPr lang="en-US" sz="1900" b="1" dirty="0" err="1"/>
+              <a:t>ST_Slope</a:t>
+            </a:r>
+            <a:r>
+              <a:rPr lang="en-US" sz="1900" dirty="0"/>
+              <a:t>: the slope of the peak exercise ST segment [Up: upsloping, Flat: flat, Down: </a:t>
+            </a:r>
+            <a:r>
+              <a:rPr lang="en-US" sz="1900" dirty="0" err="1"/>
+              <a:t>downsloping</a:t>
+            </a:r>
+            <a:r>
+              <a:rPr lang="en-US" sz="1900" dirty="0"/>
+              <a:t>]</a:t>
+            </a:r>
+          </a:p>
+          <a:p>
+            <a:pPr marL="0" indent="0">
+              <a:buNone/>
+            </a:pPr>
+            <a:r>
+              <a:rPr lang="en-US" sz="1900" b="1" dirty="0" err="1"/>
+              <a:t>HeartDisease</a:t>
+            </a:r>
+            <a:r>
+              <a:rPr lang="en-US" sz="1900" dirty="0"/>
+              <a:t>: output class [1: heart disease, 0: Normal]</a:t>
+            </a:r>
+          </a:p>
+          <a:p>
             <a:pPr marL="457200" lvl="1" indent="0">
               <a:buNone/>
             </a:pPr>
-            <a:r>
-              <a:rPr lang="en-US" sz="2000" dirty="0">
-                <a:effectLst/>
-              </a:rPr>
-              <a:t>Words…</a:t>
-            </a:r>
+            <a:endParaRPr lang="en-US" sz="2000" dirty="0">
+              <a:effectLst/>
+            </a:endParaRPr>
           </a:p>
         </p:txBody>
       </p:sp>
@@ -5297,7 +5454,7 @@
     </p:spTree>
     <p:extLst>
       <p:ext uri="{BB962C8B-B14F-4D97-AF65-F5344CB8AC3E}">
-        <p14:creationId xmlns:p14="http://schemas.microsoft.com/office/powerpoint/2010/main" val="639892534"/>
+        <p14:creationId xmlns:p14="http://schemas.microsoft.com/office/powerpoint/2010/main" val="946419350"/>
       </p:ext>
     </p:extLst>
   </p:cSld>
@@ -5437,9 +5594,10 @@
           <a:lstStyle/>
           <a:p>
             <a:r>
-              <a:rPr lang="en-US" sz="4000" b="1" dirty="0"/>
-              <a:t>Future extensions of your work</a:t>
-            </a:r>
+              <a:rPr lang="en-US" sz="4000" b="1"/>
+              <a:t>Results and Observations</a:t>
+            </a:r>
+            <a:endParaRPr lang="en-US" sz="4000" b="1" dirty="0"/>
           </a:p>
         </p:txBody>
       </p:sp>
@@ -5461,13 +5619,13 @@
         </p:nvSpPr>
         <p:spPr>
           <a:xfrm>
-            <a:off x="1136397" y="2418409"/>
+            <a:off x="1136397" y="1890378"/>
             <a:ext cx="9688296" cy="3782694"/>
           </a:xfrm>
         </p:spPr>
         <p:txBody>
           <a:bodyPr anchor="t">
-            <a:normAutofit/>
+            <a:normAutofit fontScale="92500" lnSpcReduction="10000"/>
           </a:bodyPr>
           <a:lstStyle/>
           <a:p>
@@ -5475,11 +5633,98 @@
               <a:buNone/>
             </a:pPr>
             <a:r>
-              <a:rPr lang="en-US" sz="2000" dirty="0">
+              <a:rPr lang="en-US" sz="2000" b="1" u="sng" dirty="0">
                 <a:effectLst/>
               </a:rPr>
-              <a:t>Words…</a:t>
-            </a:r>
+              <a:t>Neural Network</a:t>
+            </a:r>
+          </a:p>
+          <a:p>
+            <a:pPr marL="0" indent="0">
+              <a:buNone/>
+            </a:pPr>
+            <a:r>
+              <a:rPr lang="en-US" sz="1600" dirty="0"/>
+              <a:t>Experiment</a:t>
+            </a:r>
+          </a:p>
+          <a:p>
+            <a:r>
+              <a:rPr lang="en-US" sz="1600" dirty="0"/>
+              <a:t>In our experiment, we chose the </a:t>
+            </a:r>
+            <a:r>
+              <a:rPr lang="en-US" sz="1600" dirty="0" err="1"/>
+              <a:t>pytorch</a:t>
+            </a:r>
+            <a:r>
+              <a:rPr lang="en-US" sz="1600" dirty="0"/>
+              <a:t> library to build a neural network for this classification task. The motivation was to use an available deep learning library that provides various </a:t>
+            </a:r>
+            <a:r>
+              <a:rPr lang="en-US" sz="1600" dirty="0" err="1"/>
+              <a:t>optmizers</a:t>
+            </a:r>
+            <a:r>
+              <a:rPr lang="en-US" sz="1600" dirty="0"/>
+              <a:t> and loss functions and an easy way to tune </a:t>
+            </a:r>
+            <a:r>
+              <a:rPr lang="en-US" sz="1600" dirty="0" err="1"/>
+              <a:t>hyperparamters</a:t>
+            </a:r>
+            <a:r>
+              <a:rPr lang="en-US" sz="1600" dirty="0"/>
+              <a:t> so we can arrive at the most accurate network. In this experiment we found that a neural network with 2 layers performed best with our data set of heart data. we ran the experiment with 8 -14 neurons in the first layer and 2 neurons in the final layer with the </a:t>
+            </a:r>
+            <a:r>
+              <a:rPr lang="en-US" sz="1600" dirty="0" err="1"/>
+              <a:t>leakyrelu</a:t>
+            </a:r>
+            <a:r>
+              <a:rPr lang="en-US" sz="1600" dirty="0"/>
+              <a:t> activation to predict the chances of heart failure.</a:t>
+            </a:r>
+          </a:p>
+          <a:p>
+            <a:endParaRPr lang="en-US" sz="1600" dirty="0"/>
+          </a:p>
+          <a:p>
+            <a:pPr marL="0" indent="0">
+              <a:buNone/>
+            </a:pPr>
+            <a:r>
+              <a:rPr lang="en-US" sz="1600" dirty="0"/>
+              <a:t>Observation</a:t>
+            </a:r>
+          </a:p>
+          <a:p>
+            <a:r>
+              <a:rPr lang="en-US" sz="1600" dirty="0"/>
+              <a:t>We were able to achieve a top accuracy of 86% over the test data with 12 neurons in the first layer and with optimizer set as </a:t>
+            </a:r>
+            <a:r>
+              <a:rPr lang="en-US" sz="1600" dirty="0" err="1"/>
+              <a:t>RMSProp</a:t>
+            </a:r>
+            <a:r>
+              <a:rPr lang="en-US" sz="1600" dirty="0"/>
+              <a:t>.</a:t>
+            </a:r>
+          </a:p>
+          <a:p>
+            <a:endParaRPr lang="en-US" sz="1600" dirty="0"/>
+          </a:p>
+          <a:p>
+            <a:pPr marL="0" indent="0">
+              <a:buNone/>
+            </a:pPr>
+            <a:br>
+              <a:rPr lang="en-US" sz="1600" dirty="0"/>
+            </a:br>
+            <a:endParaRPr lang="en-US" sz="2000" dirty="0">
+              <a:effectLst/>
+            </a:endParaRPr>
           </a:p>
         </p:txBody>
       </p:sp>
@@ -5632,7 +5877,7 @@
     </p:spTree>
     <p:extLst>
       <p:ext uri="{BB962C8B-B14F-4D97-AF65-F5344CB8AC3E}">
-        <p14:creationId xmlns:p14="http://schemas.microsoft.com/office/powerpoint/2010/main" val="1396956347"/>
+        <p14:creationId xmlns:p14="http://schemas.microsoft.com/office/powerpoint/2010/main" val="639892534"/>
       </p:ext>
     </p:extLst>
   </p:cSld>
@@ -5748,6 +5993,341 @@
           <p:cNvPr id="2" name="Title 1">
             <a:extLst>
               <a:ext uri="{FF2B5EF4-FFF2-40B4-BE49-F238E27FC236}">
+                <a16:creationId xmlns:a16="http://schemas.microsoft.com/office/drawing/2014/main" id="{5C4F02F6-349D-954F-B02F-78EBD3017252}"/>
+              </a:ext>
+            </a:extLst>
+          </p:cNvPr>
+          <p:cNvSpPr>
+            <a:spLocks noGrp="1"/>
+          </p:cNvSpPr>
+          <p:nvPr>
+            <p:ph type="title"/>
+          </p:nvPr>
+        </p:nvSpPr>
+        <p:spPr>
+          <a:xfrm>
+            <a:off x="1136397" y="502022"/>
+            <a:ext cx="9688296" cy="1388356"/>
+          </a:xfrm>
+        </p:spPr>
+        <p:txBody>
+          <a:bodyPr anchor="b">
+            <a:normAutofit/>
+          </a:bodyPr>
+          <a:lstStyle/>
+          <a:p>
+            <a:r>
+              <a:rPr lang="en-US" sz="4000" b="1" dirty="0"/>
+              <a:t>Future extensions of your work</a:t>
+            </a:r>
+          </a:p>
+        </p:txBody>
+      </p:sp>
+      <p:sp>
+        <p:nvSpPr>
+          <p:cNvPr id="3" name="Content Placeholder 2">
+            <a:extLst>
+              <a:ext uri="{FF2B5EF4-FFF2-40B4-BE49-F238E27FC236}">
+                <a16:creationId xmlns:a16="http://schemas.microsoft.com/office/drawing/2014/main" id="{3A721E59-1DC4-3845-9DB3-10F69E64143F}"/>
+              </a:ext>
+            </a:extLst>
+          </p:cNvPr>
+          <p:cNvSpPr>
+            <a:spLocks noGrp="1"/>
+          </p:cNvSpPr>
+          <p:nvPr>
+            <p:ph idx="1"/>
+          </p:nvPr>
+        </p:nvSpPr>
+        <p:spPr>
+          <a:xfrm>
+            <a:off x="1136397" y="2418409"/>
+            <a:ext cx="9688296" cy="3782694"/>
+          </a:xfrm>
+        </p:spPr>
+        <p:txBody>
+          <a:bodyPr anchor="t">
+            <a:normAutofit/>
+          </a:bodyPr>
+          <a:lstStyle/>
+          <a:p>
+            <a:pPr marL="457200" lvl="1" indent="0">
+              <a:buNone/>
+            </a:pPr>
+            <a:r>
+              <a:rPr lang="en-US" sz="2000" dirty="0">
+                <a:effectLst/>
+              </a:rPr>
+              <a:t>Words…</a:t>
+            </a:r>
+          </a:p>
+        </p:txBody>
+      </p:sp>
+      <p:sp>
+        <p:nvSpPr>
+          <p:cNvPr id="10" name="Rectangle 9">
+            <a:extLst>
+              <a:ext uri="{FF2B5EF4-FFF2-40B4-BE49-F238E27FC236}">
+                <a16:creationId xmlns:a16="http://schemas.microsoft.com/office/drawing/2014/main" id="{EEBF1590-3B36-48EE-A89D-3B6F3CB256AB}"/>
+              </a:ext>
+              <a:ext uri="{C183D7F6-B498-43B3-948B-1728B52AA6E4}">
+                <adec:decorative xmlns:adec="http://schemas.microsoft.com/office/drawing/2017/decorative" val="1"/>
+              </a:ext>
+            </a:extLst>
+          </p:cNvPr>
+          <p:cNvSpPr>
+            <a:spLocks noGrp="1" noRot="1" noChangeAspect="1" noMove="1" noResize="1" noEditPoints="1" noAdjustHandles="1" noChangeArrowheads="1" noChangeShapeType="1" noTextEdit="1"/>
+          </p:cNvSpPr>
+          <p:nvPr>
+            <p:extLst>
+              <p:ext uri="{386F3935-93C4-4BCD-93E2-E3B085C9AB24}">
+                <p16:designElem xmlns:p16="http://schemas.microsoft.com/office/powerpoint/2015/main" val="1"/>
+              </p:ext>
+            </p:extLst>
+          </p:nvPr>
+        </p:nvSpPr>
+        <p:spPr>
+          <a:xfrm rot="10800000" flipH="1">
+            <a:off x="0" y="6400799"/>
+            <a:ext cx="12192000" cy="456773"/>
+          </a:xfrm>
+          <a:prstGeom prst="rect">
+            <a:avLst/>
+          </a:prstGeom>
+          <a:gradFill>
+            <a:gsLst>
+              <a:gs pos="0">
+                <a:schemeClr val="accent1"/>
+              </a:gs>
+              <a:gs pos="78000">
+                <a:srgbClr val="000000"/>
+              </a:gs>
+            </a:gsLst>
+            <a:lin ang="2400000" scaled="0"/>
+          </a:gradFill>
+          <a:ln>
+            <a:noFill/>
+          </a:ln>
+        </p:spPr>
+        <p:style>
+          <a:lnRef idx="2">
+            <a:schemeClr val="accent1">
+              <a:shade val="50000"/>
+            </a:schemeClr>
+          </a:lnRef>
+          <a:fillRef idx="1">
+            <a:schemeClr val="accent1"/>
+          </a:fillRef>
+          <a:effectRef idx="0">
+            <a:schemeClr val="accent1"/>
+          </a:effectRef>
+          <a:fontRef idx="minor">
+            <a:schemeClr val="lt1"/>
+          </a:fontRef>
+        </p:style>
+        <p:txBody>
+          <a:bodyPr rtlCol="0" anchor="ctr"/>
+          <a:lstStyle/>
+          <a:p>
+            <a:pPr algn="ctr"/>
+            <a:endParaRPr lang="en-US"/>
+          </a:p>
+        </p:txBody>
+      </p:sp>
+      <p:sp>
+        <p:nvSpPr>
+          <p:cNvPr id="12" name="Rectangle 11">
+            <a:extLst>
+              <a:ext uri="{FF2B5EF4-FFF2-40B4-BE49-F238E27FC236}">
+                <a16:creationId xmlns:a16="http://schemas.microsoft.com/office/drawing/2014/main" id="{AC8F6C8C-AB5A-4548-942D-E3FD40ACBC49}"/>
+              </a:ext>
+              <a:ext uri="{C183D7F6-B498-43B3-948B-1728B52AA6E4}">
+                <adec:decorative xmlns:adec="http://schemas.microsoft.com/office/drawing/2017/decorative" val="1"/>
+              </a:ext>
+            </a:extLst>
+          </p:cNvPr>
+          <p:cNvSpPr>
+            <a:spLocks noGrp="1" noRot="1" noChangeAspect="1" noMove="1" noResize="1" noEditPoints="1" noAdjustHandles="1" noChangeArrowheads="1" noChangeShapeType="1" noTextEdit="1"/>
+          </p:cNvSpPr>
+          <p:nvPr>
+            <p:extLst>
+              <p:ext uri="{386F3935-93C4-4BCD-93E2-E3B085C9AB24}">
+                <p16:designElem xmlns:p16="http://schemas.microsoft.com/office/powerpoint/2015/main" val="1"/>
+              </p:ext>
+            </p:extLst>
+          </p:nvPr>
+        </p:nvSpPr>
+        <p:spPr>
+          <a:xfrm flipH="1">
+            <a:off x="4038600" y="6400799"/>
+            <a:ext cx="8153398" cy="456772"/>
+          </a:xfrm>
+          <a:prstGeom prst="rect">
+            <a:avLst/>
+          </a:prstGeom>
+          <a:gradFill>
+            <a:gsLst>
+              <a:gs pos="0">
+                <a:srgbClr val="000000">
+                  <a:alpha val="63000"/>
+                </a:srgbClr>
+              </a:gs>
+              <a:gs pos="100000">
+                <a:schemeClr val="accent1">
+                  <a:lumMod val="75000"/>
+                </a:schemeClr>
+              </a:gs>
+            </a:gsLst>
+            <a:lin ang="13800000" scaled="0"/>
+          </a:gradFill>
+          <a:ln>
+            <a:noFill/>
+          </a:ln>
+        </p:spPr>
+        <p:style>
+          <a:lnRef idx="2">
+            <a:schemeClr val="accent1">
+              <a:shade val="50000"/>
+            </a:schemeClr>
+          </a:lnRef>
+          <a:fillRef idx="1">
+            <a:schemeClr val="accent1"/>
+          </a:fillRef>
+          <a:effectRef idx="0">
+            <a:schemeClr val="accent1"/>
+          </a:effectRef>
+          <a:fontRef idx="minor">
+            <a:schemeClr val="lt1"/>
+          </a:fontRef>
+        </p:style>
+        <p:txBody>
+          <a:bodyPr rtlCol="0" anchor="ctr"/>
+          <a:lstStyle/>
+          <a:p>
+            <a:pPr algn="ctr"/>
+            <a:endParaRPr lang="en-US"/>
+          </a:p>
+        </p:txBody>
+      </p:sp>
+    </p:spTree>
+    <p:extLst>
+      <p:ext uri="{BB962C8B-B14F-4D97-AF65-F5344CB8AC3E}">
+        <p14:creationId xmlns:p14="http://schemas.microsoft.com/office/powerpoint/2010/main" val="1396956347"/>
+      </p:ext>
+    </p:extLst>
+  </p:cSld>
+  <p:clrMapOvr>
+    <a:masterClrMapping/>
+  </p:clrMapOvr>
+</p:sld>
+</file>
+
+<file path=ppt/slides/slide14.xml><?xml version="1.0" encoding="utf-8"?>
+<p:sld xmlns:a="http://schemas.openxmlformats.org/drawingml/2006/main" xmlns:r="http://schemas.openxmlformats.org/officeDocument/2006/relationships" xmlns:p="http://schemas.openxmlformats.org/presentationml/2006/main">
+  <p:cSld>
+    <p:bg>
+      <p:bgPr>
+        <a:solidFill>
+          <a:schemeClr val="bg1"/>
+        </a:solidFill>
+        <a:effectLst/>
+      </p:bgPr>
+    </p:bg>
+    <p:spTree>
+      <p:nvGrpSpPr>
+        <p:cNvPr id="1" name=""/>
+        <p:cNvGrpSpPr/>
+        <p:nvPr/>
+      </p:nvGrpSpPr>
+      <p:grpSpPr>
+        <a:xfrm>
+          <a:off x="0" y="0"/>
+          <a:ext cx="0" cy="0"/>
+          <a:chOff x="0" y="0"/>
+          <a:chExt cx="0" cy="0"/>
+        </a:xfrm>
+      </p:grpSpPr>
+      <p:sp useBgFill="1">
+        <p:nvSpPr>
+          <p:cNvPr id="8" name="Rectangle 7">
+            <a:extLst>
+              <a:ext uri="{FF2B5EF4-FFF2-40B4-BE49-F238E27FC236}">
+                <a16:creationId xmlns:a16="http://schemas.microsoft.com/office/drawing/2014/main" id="{979E27D9-03C7-44E2-9FF8-15D0C8506AF7}"/>
+              </a:ext>
+              <a:ext uri="{C183D7F6-B498-43B3-948B-1728B52AA6E4}">
+                <adec:decorative xmlns:adec="http://schemas.microsoft.com/office/drawing/2017/decorative" val="1"/>
+              </a:ext>
+            </a:extLst>
+          </p:cNvPr>
+          <p:cNvSpPr>
+            <a:spLocks noGrp="1" noRot="1" noChangeAspect="1" noMove="1" noResize="1" noEditPoints="1" noAdjustHandles="1" noChangeArrowheads="1" noChangeShapeType="1" noTextEdit="1"/>
+          </p:cNvSpPr>
+          <p:nvPr>
+            <p:extLst>
+              <p:ext uri="{386F3935-93C4-4BCD-93E2-E3B085C9AB24}">
+                <p16:designElem xmlns:p16="http://schemas.microsoft.com/office/powerpoint/2015/main" val="1"/>
+              </p:ext>
+            </p:extLst>
+          </p:nvPr>
+        </p:nvSpPr>
+        <p:spPr>
+          <a:xfrm>
+            <a:off x="0" y="0"/>
+            <a:ext cx="12192000" cy="6858000"/>
+          </a:xfrm>
+          <a:prstGeom prst="rect">
+            <a:avLst/>
+          </a:prstGeom>
+          <a:ln w="12700" cap="flat" cmpd="sng" algn="ctr">
+            <a:noFill/>
+            <a:prstDash val="solid"/>
+            <a:miter lim="800000"/>
+          </a:ln>
+          <a:effectLst/>
+          <a:extLst>
+            <a:ext uri="{91240B29-F687-4F45-9708-019B960494DF}">
+              <a14:hiddenLine xmlns:a14="http://schemas.microsoft.com/office/drawing/2010/main" w="12700" cap="flat" cmpd="sng" algn="ctr">
+                <a:solidFill>
+                  <a:schemeClr val="accent1">
+                    <a:shade val="50000"/>
+                  </a:schemeClr>
+                </a:solidFill>
+                <a:prstDash val="solid"/>
+                <a:miter lim="800000"/>
+              </a14:hiddenLine>
+            </a:ext>
+          </a:extLst>
+        </p:spPr>
+        <p:style>
+          <a:lnRef idx="2">
+            <a:schemeClr val="accent1">
+              <a:shade val="50000"/>
+            </a:schemeClr>
+          </a:lnRef>
+          <a:fillRef idx="1">
+            <a:schemeClr val="accent1"/>
+          </a:fillRef>
+          <a:effectRef idx="0">
+            <a:schemeClr val="accent1"/>
+          </a:effectRef>
+          <a:fontRef idx="minor">
+            <a:schemeClr val="lt1"/>
+          </a:fontRef>
+        </p:style>
+        <p:txBody>
+          <a:bodyPr rtlCol="0" anchor="ctr"/>
+          <a:lstStyle/>
+          <a:p>
+            <a:pPr algn="ctr"/>
+            <a:endParaRPr lang="en-US"/>
+          </a:p>
+        </p:txBody>
+      </p:sp>
+      <p:sp>
+        <p:nvSpPr>
+          <p:cNvPr id="2" name="Title 1">
+            <a:extLst>
+              <a:ext uri="{FF2B5EF4-FFF2-40B4-BE49-F238E27FC236}">
                 <a16:creationId xmlns:a16="http://schemas.microsoft.com/office/drawing/2014/main" id="{8B337B21-1E26-A847-AC61-FDA5EEFBFA48}"/>
               </a:ext>
             </a:extLst>
@@ -5983,7 +6563,7 @@
 </p:sld>
 </file>
 
-<file path=ppt/slides/slide14.xml><?xml version="1.0" encoding="utf-8"?>
+<file path=ppt/slides/slide15.xml><?xml version="1.0" encoding="utf-8"?>
 <p:sld xmlns:a="http://schemas.openxmlformats.org/drawingml/2006/main" xmlns:r="http://schemas.openxmlformats.org/officeDocument/2006/relationships" xmlns:p="http://schemas.openxmlformats.org/presentationml/2006/main">
   <p:cSld>
     <p:bg>
@@ -6665,7 +7245,7 @@
 </p:sld>
 </file>
 
-<file path=ppt/slides/slide15.xml><?xml version="1.0" encoding="utf-8"?>
+<file path=ppt/slides/slide16.xml><?xml version="1.0" encoding="utf-8"?>
 <p:sld xmlns:a="http://schemas.openxmlformats.org/drawingml/2006/main" xmlns:r="http://schemas.openxmlformats.org/officeDocument/2006/relationships" xmlns:p="http://schemas.openxmlformats.org/presentationml/2006/main">
   <p:cSld>
     <p:bg>
@@ -7214,7 +7794,7 @@
 </p:sld>
 </file>
 
-<file path=ppt/slides/slide16.xml><?xml version="1.0" encoding="utf-8"?>
+<file path=ppt/slides/slide17.xml><?xml version="1.0" encoding="utf-8"?>
 <p:sld xmlns:a="http://schemas.openxmlformats.org/drawingml/2006/main" xmlns:r="http://schemas.openxmlformats.org/officeDocument/2006/relationships" xmlns:p="http://schemas.openxmlformats.org/presentationml/2006/main">
   <p:cSld>
     <p:bg>
@@ -10624,14 +11204,6 @@
 <file path=ppt/slides/slide9.xml><?xml version="1.0" encoding="utf-8"?>
 <p:sld xmlns:a="http://schemas.openxmlformats.org/drawingml/2006/main" xmlns:r="http://schemas.openxmlformats.org/officeDocument/2006/relationships" xmlns:p="http://schemas.openxmlformats.org/presentationml/2006/main">
   <p:cSld>
-    <p:bg>
-      <p:bgPr>
-        <a:solidFill>
-          <a:schemeClr val="bg1"/>
-        </a:solidFill>
-        <a:effectLst/>
-      </p:bgPr>
-    </p:bg>
     <p:spTree>
       <p:nvGrpSpPr>
         <p:cNvPr id="1" name=""/>
@@ -10646,102 +11218,26 @@
           <a:chExt cx="0" cy="0"/>
         </a:xfrm>
       </p:grpSpPr>
-      <p:sp useBgFill="1">
-        <p:nvSpPr>
-          <p:cNvPr id="10" name="Rectangle 9">
-            <a:extLst>
-              <a:ext uri="{FF2B5EF4-FFF2-40B4-BE49-F238E27FC236}">
-                <a16:creationId xmlns:a16="http://schemas.microsoft.com/office/drawing/2014/main" id="{3346177D-ADC4-4968-B747-5CFCD390B5B9}"/>
-              </a:ext>
-              <a:ext uri="{C183D7F6-B498-43B3-948B-1728B52AA6E4}">
-                <adec:decorative xmlns:adec="http://schemas.microsoft.com/office/drawing/2017/decorative" val="1"/>
-              </a:ext>
-            </a:extLst>
-          </p:cNvPr>
-          <p:cNvSpPr>
-            <a:spLocks noGrp="1" noRot="1" noChangeAspect="1" noMove="1" noResize="1" noEditPoints="1" noAdjustHandles="1" noChangeArrowheads="1" noChangeShapeType="1" noTextEdit="1"/>
-          </p:cNvSpPr>
-          <p:nvPr>
-            <p:extLst>
-              <p:ext uri="{386F3935-93C4-4BCD-93E2-E3B085C9AB24}">
-                <p16:designElem xmlns:p16="http://schemas.microsoft.com/office/powerpoint/2015/main" val="1"/>
-              </p:ext>
-            </p:extLst>
+      <p:sp>
+        <p:nvSpPr>
+          <p:cNvPr id="2" name="Title 1">
+            <a:extLst>
+              <a:ext uri="{FF2B5EF4-FFF2-40B4-BE49-F238E27FC236}">
+                <a16:creationId xmlns:a16="http://schemas.microsoft.com/office/drawing/2014/main" id="{5C4F02F6-349D-954F-B02F-78EBD3017252}"/>
+              </a:ext>
+            </a:extLst>
+          </p:cNvPr>
+          <p:cNvSpPr>
+            <a:spLocks noGrp="1"/>
+          </p:cNvSpPr>
+          <p:nvPr>
+            <p:ph type="title"/>
           </p:nvPr>
         </p:nvSpPr>
         <p:spPr>
           <a:xfrm>
-            <a:off x="0" y="0"/>
-            <a:ext cx="12192000" cy="6858000"/>
-          </a:xfrm>
-          <a:prstGeom prst="rect">
-            <a:avLst/>
-          </a:prstGeom>
-          <a:ln w="12700" cap="flat" cmpd="sng" algn="ctr">
-            <a:noFill/>
-            <a:prstDash val="solid"/>
-            <a:miter lim="800000"/>
-          </a:ln>
-          <a:effectLst/>
-          <a:extLst>
-            <a:ext uri="{91240B29-F687-4F45-9708-019B960494DF}">
-              <a14:hiddenLine xmlns:a14="http://schemas.microsoft.com/office/drawing/2010/main" w="12700" cap="flat" cmpd="sng" algn="ctr">
-                <a:solidFill>
-                  <a:schemeClr val="accent1">
-                    <a:shade val="50000"/>
-                  </a:schemeClr>
-                </a:solidFill>
-                <a:prstDash val="solid"/>
-                <a:miter lim="800000"/>
-              </a14:hiddenLine>
-            </a:ext>
-          </a:extLst>
-        </p:spPr>
-        <p:style>
-          <a:lnRef idx="2">
-            <a:schemeClr val="accent1">
-              <a:shade val="50000"/>
-            </a:schemeClr>
-          </a:lnRef>
-          <a:fillRef idx="1">
-            <a:schemeClr val="accent1"/>
-          </a:fillRef>
-          <a:effectRef idx="0">
-            <a:schemeClr val="accent1"/>
-          </a:effectRef>
-          <a:fontRef idx="minor">
-            <a:schemeClr val="lt1"/>
-          </a:fontRef>
-        </p:style>
-        <p:txBody>
-          <a:bodyPr rtlCol="0" anchor="ctr"/>
-          <a:lstStyle/>
-          <a:p>
-            <a:pPr algn="ctr"/>
-            <a:endParaRPr lang="en-US"/>
-          </a:p>
-        </p:txBody>
-      </p:sp>
-      <p:sp>
-        <p:nvSpPr>
-          <p:cNvPr id="2" name="Title 1">
-            <a:extLst>
-              <a:ext uri="{FF2B5EF4-FFF2-40B4-BE49-F238E27FC236}">
-                <a16:creationId xmlns:a16="http://schemas.microsoft.com/office/drawing/2014/main" id="{1518A51C-AC5C-224B-83E1-BE4285E72E3E}"/>
-              </a:ext>
-            </a:extLst>
-          </p:cNvPr>
-          <p:cNvSpPr>
-            <a:spLocks noGrp="1"/>
-          </p:cNvSpPr>
-          <p:nvPr>
-            <p:ph type="title"/>
-          </p:nvPr>
-        </p:nvSpPr>
-        <p:spPr>
-          <a:xfrm>
-            <a:off x="5596501" y="489509"/>
-            <a:ext cx="5754896" cy="785562"/>
+            <a:off x="1136397" y="502022"/>
+            <a:ext cx="9688296" cy="1388356"/>
           </a:xfrm>
         </p:spPr>
         <p:txBody>
@@ -10751,74 +11247,45 @@
           <a:lstStyle/>
           <a:p>
             <a:r>
-              <a:rPr lang="en-US" sz="4000" b="1" dirty="0"/>
-              <a:t>Source of Data: </a:t>
-            </a:r>
-            <a:r>
               <a:rPr lang="en-US" sz="4000" b="1" dirty="0">
                 <a:solidFill>
-                  <a:srgbClr val="00B0F0"/>
+                  <a:srgbClr val="1D1C1D"/>
                 </a:solidFill>
               </a:rPr>
-              <a:t>Kaggle</a:t>
-            </a:r>
-          </a:p>
-        </p:txBody>
-      </p:sp>
-      <p:pic>
-        <p:nvPicPr>
-          <p:cNvPr id="5" name="Picture 4">
-            <a:extLst>
-              <a:ext uri="{FF2B5EF4-FFF2-40B4-BE49-F238E27FC236}">
-                <a16:creationId xmlns:a16="http://schemas.microsoft.com/office/drawing/2014/main" id="{5656DBCB-4246-3424-8BF4-9B7FD47CD472}"/>
-              </a:ext>
-            </a:extLst>
-          </p:cNvPr>
-          <p:cNvPicPr>
-            <a:picLocks noChangeAspect="1"/>
-          </p:cNvPicPr>
-          <p:nvPr/>
-        </p:nvPicPr>
-        <p:blipFill>
-          <a:blip r:embed="rId3"/>
-          <a:srcRect/>
-          <a:stretch/>
-        </p:blipFill>
+              <a:t>Neural Network </a:t>
+            </a:r>
+            <a:r>
+              <a:rPr lang="en-US" sz="4000" b="1" dirty="0"/>
+              <a:t>approach:</a:t>
+            </a:r>
+          </a:p>
+        </p:txBody>
+      </p:sp>
+      <p:sp>
+        <p:nvSpPr>
+          <p:cNvPr id="3" name="Content Placeholder 2">
+            <a:extLst>
+              <a:ext uri="{FF2B5EF4-FFF2-40B4-BE49-F238E27FC236}">
+                <a16:creationId xmlns:a16="http://schemas.microsoft.com/office/drawing/2014/main" id="{3A721E59-1DC4-3845-9DB3-10F69E64143F}"/>
+              </a:ext>
+            </a:extLst>
+          </p:cNvPr>
+          <p:cNvSpPr>
+            <a:spLocks noGrp="1"/>
+          </p:cNvSpPr>
+          <p:nvPr>
+            <p:ph idx="1"/>
+          </p:nvPr>
+        </p:nvSpPr>
         <p:spPr>
           <a:xfrm>
-            <a:off x="1068130" y="2332206"/>
-            <a:ext cx="3876165" cy="1761893"/>
-          </a:xfrm>
-          <a:prstGeom prst="rect">
-            <a:avLst/>
-          </a:prstGeom>
-        </p:spPr>
-      </p:pic>
-      <p:sp>
-        <p:nvSpPr>
-          <p:cNvPr id="3" name="Content Placeholder 2">
-            <a:extLst>
-              <a:ext uri="{FF2B5EF4-FFF2-40B4-BE49-F238E27FC236}">
-                <a16:creationId xmlns:a16="http://schemas.microsoft.com/office/drawing/2014/main" id="{69AB92F3-2775-4B46-A098-FE988824A88C}"/>
-              </a:ext>
-            </a:extLst>
-          </p:cNvPr>
-          <p:cNvSpPr>
-            <a:spLocks noGrp="1"/>
-          </p:cNvSpPr>
-          <p:nvPr>
-            <p:ph idx="1"/>
-          </p:nvPr>
-        </p:nvSpPr>
-        <p:spPr>
-          <a:xfrm>
-            <a:off x="5596502" y="1537855"/>
-            <a:ext cx="5930480" cy="4599709"/>
+            <a:off x="1136396" y="2418409"/>
+            <a:ext cx="9783851" cy="3782694"/>
           </a:xfrm>
         </p:spPr>
         <p:txBody>
           <a:bodyPr anchor="t">
-            <a:normAutofit fontScale="77500" lnSpcReduction="20000"/>
+            <a:normAutofit/>
           </a:bodyPr>
           <a:lstStyle/>
           <a:p>
@@ -10826,284 +11293,131 @@
               <a:buNone/>
             </a:pPr>
             <a:r>
-              <a:rPr lang="en-US" sz="2800" dirty="0"/>
-              <a:t>The </a:t>
-            </a:r>
-            <a:r>
-              <a:rPr lang="en-US" b="1" dirty="0"/>
-              <a:t>Heart Failure Prediction Dataset </a:t>
-            </a:r>
-            <a:r>
-              <a:rPr lang="en-US" sz="2800" dirty="0"/>
-              <a:t>dataset was created by combining different datasets already available independently but not combined before. In this dataset, 5 heart datasets are combined over 11 common features which makes it the largest heart disease dataset available so far for research purposes. The five datasets used for its curation are:</a:t>
+              <a:rPr lang="en-US" sz="2000" dirty="0"/>
+              <a:t>The Neural network approach can be used for classification when the labels are not linearly separable. In the context of Heart Disease prediction, we wanted to compare the performance of a neural network model vs other classification models like Logistic regression, Naïve Bayes and decision trees and find whether Neural network performs better or worse than other classification algorithms. </a:t>
             </a:r>
           </a:p>
           <a:p>
             <a:pPr marL="0" indent="0">
               <a:buNone/>
             </a:pPr>
-            <a:endParaRPr lang="en-US" sz="1000" dirty="0"/>
-          </a:p>
-          <a:p>
-            <a:pPr>
-              <a:buFont typeface="Arial" panose="020B0604020202020204" pitchFamily="34" charset="0"/>
-              <a:buChar char="•"/>
+            <a:endParaRPr lang="en-US" sz="2000" dirty="0">
+              <a:solidFill>
+                <a:srgbClr val="1D1C1D"/>
+              </a:solidFill>
+            </a:endParaRPr>
+          </a:p>
+          <a:p>
+            <a:pPr marL="0" indent="0">
+              <a:buNone/>
             </a:pPr>
             <a:r>
-              <a:rPr lang="en-US" sz="2000" i="1" dirty="0"/>
-              <a:t>Cleveland</a:t>
-            </a:r>
-            <a:r>
-              <a:rPr lang="en-US" sz="2000" dirty="0"/>
-              <a:t>: 303 observations</a:t>
-            </a:r>
-          </a:p>
-          <a:p>
-            <a:pPr>
-              <a:buFont typeface="Arial" panose="020B0604020202020204" pitchFamily="34" charset="0"/>
-              <a:buChar char="•"/>
+              <a:rPr lang="en-US" sz="2000" dirty="0">
+                <a:solidFill>
+                  <a:srgbClr val="1D1C1D"/>
+                </a:solidFill>
+              </a:rPr>
+              <a:t>A feedforward network works by first doing a forward pass on the input data through all the artificial neurons using the current weights and an activation function (like </a:t>
+            </a:r>
+            <a:r>
+              <a:rPr lang="en-US" sz="2000" dirty="0" err="1">
+                <a:solidFill>
+                  <a:srgbClr val="1D1C1D"/>
+                </a:solidFill>
+              </a:rPr>
+              <a:t>Relu</a:t>
+            </a:r>
+            <a:r>
+              <a:rPr lang="en-US" sz="2000" dirty="0">
+                <a:solidFill>
+                  <a:srgbClr val="1D1C1D"/>
+                </a:solidFill>
+              </a:rPr>
+              <a:t>, Sigmoid </a:t>
+            </a:r>
+            <a:r>
+              <a:rPr lang="en-US" sz="2000" dirty="0" err="1">
+                <a:solidFill>
+                  <a:srgbClr val="1D1C1D"/>
+                </a:solidFill>
+              </a:rPr>
+              <a:t>etc</a:t>
+            </a:r>
+            <a:r>
+              <a:rPr lang="en-US" sz="2000" dirty="0">
+                <a:solidFill>
+                  <a:srgbClr val="1D1C1D"/>
+                </a:solidFill>
+              </a:rPr>
+              <a:t>)</a:t>
+            </a:r>
+          </a:p>
+          <a:p>
+            <a:pPr marL="0" indent="0">
+              <a:buNone/>
             </a:pPr>
             <a:r>
-              <a:rPr lang="en-US" sz="2000" i="1" dirty="0"/>
-              <a:t>Hungarian</a:t>
-            </a:r>
-            <a:r>
-              <a:rPr lang="en-US" sz="2000" dirty="0"/>
-              <a:t>: 294 observations</a:t>
-            </a:r>
-          </a:p>
-          <a:p>
-            <a:pPr>
-              <a:buFont typeface="Arial" panose="020B0604020202020204" pitchFamily="34" charset="0"/>
-              <a:buChar char="•"/>
+              <a:rPr lang="en-US" sz="2000" dirty="0">
+                <a:solidFill>
+                  <a:srgbClr val="1D1C1D"/>
+                </a:solidFill>
+              </a:rPr>
+              <a:t>Then the network minimizes the cost by adjusting the weights using back propagation on all the layers to learn the model</a:t>
+            </a:r>
+            <a:endParaRPr lang="en-US" sz="1200" dirty="0">
+              <a:solidFill>
+                <a:srgbClr val="1D1C1D"/>
+              </a:solidFill>
+            </a:endParaRPr>
+          </a:p>
+          <a:p>
+            <a:pPr marL="0" indent="0">
+              <a:buNone/>
             </a:pPr>
-            <a:r>
-              <a:rPr lang="en-US" sz="2000" i="1" dirty="0"/>
-              <a:t>Switzerland</a:t>
-            </a:r>
-            <a:r>
-              <a:rPr lang="en-US" sz="2000" dirty="0"/>
-              <a:t>: 123 observations</a:t>
-            </a:r>
-          </a:p>
-          <a:p>
-            <a:pPr>
-              <a:buFont typeface="Arial" panose="020B0604020202020204" pitchFamily="34" charset="0"/>
-              <a:buChar char="•"/>
+            <a:endParaRPr lang="en-US" sz="1200" dirty="0">
+              <a:solidFill>
+                <a:srgbClr val="1D1C1D"/>
+              </a:solidFill>
+              <a:effectLst/>
+            </a:endParaRPr>
+          </a:p>
+          <a:p>
+            <a:pPr marL="0" indent="0">
+              <a:buNone/>
             </a:pPr>
-            <a:r>
-              <a:rPr lang="en-US" sz="2000" i="1" dirty="0"/>
-              <a:t>Long Beach VA</a:t>
-            </a:r>
-            <a:r>
-              <a:rPr lang="en-US" sz="2000" dirty="0"/>
-              <a:t>: 200 observations</a:t>
-            </a:r>
-          </a:p>
-          <a:p>
-            <a:pPr>
-              <a:buFont typeface="Arial" panose="020B0604020202020204" pitchFamily="34" charset="0"/>
-              <a:buChar char="•"/>
+            <a:endParaRPr lang="en-US" sz="2000" dirty="0">
+              <a:solidFill>
+                <a:srgbClr val="1D1C1D"/>
+              </a:solidFill>
+            </a:endParaRPr>
+          </a:p>
+          <a:p>
+            <a:pPr marL="0" indent="0">
+              <a:buNone/>
             </a:pPr>
-            <a:r>
-              <a:rPr lang="en-US" sz="2000" i="1" dirty="0" err="1"/>
-              <a:t>Stalog</a:t>
-            </a:r>
-            <a:r>
-              <a:rPr lang="en-US" sz="2000" i="1" dirty="0"/>
-              <a:t> (Heart) Data Set</a:t>
-            </a:r>
-            <a:r>
-              <a:rPr lang="en-US" sz="2000" dirty="0"/>
-              <a:t>: 270 observations</a:t>
-            </a:r>
+            <a:endParaRPr lang="en-US" sz="2000" dirty="0">
+              <a:solidFill>
+                <a:srgbClr val="1D1C1D"/>
+              </a:solidFill>
+            </a:endParaRPr>
           </a:p>
           <a:p>
             <a:pPr marL="0" indent="0">
               <a:buNone/>
             </a:pPr>
-            <a:endParaRPr lang="en-US" sz="1000" dirty="0"/>
-          </a:p>
-          <a:p>
-            <a:pPr marL="0" indent="0">
-              <a:buNone/>
-            </a:pPr>
-            <a:r>
-              <a:rPr lang="en-US" sz="1200" dirty="0"/>
-              <a:t>Every dataset used can be found under the Index of heart disease datasets from UCI Machine Learning Repository on the following link: </a:t>
-            </a:r>
-            <a:r>
-              <a:rPr lang="en-US" sz="1200" dirty="0">
-                <a:hlinkClick r:id="rId4"/>
-              </a:rPr>
-              <a:t>https://archive.ics.uci.edu/ml/machine-learning-databases/heart-disease/</a:t>
-            </a:r>
-            <a:endParaRPr lang="en-US" sz="1200" dirty="0"/>
-          </a:p>
-          <a:p>
-            <a:pPr marL="0" indent="0">
-              <a:buNone/>
-            </a:pPr>
-            <a:r>
-              <a:rPr lang="en-US" sz="1200" dirty="0">
-                <a:hlinkClick r:id="rId5"/>
-              </a:rPr>
-              <a:t>https://www.kaggle.com/datasets/fedesoriano/heart-failure-prediction</a:t>
-            </a:r>
-            <a:endParaRPr lang="en-US" sz="1200" dirty="0"/>
-          </a:p>
-        </p:txBody>
-      </p:sp>
-      <p:sp>
-        <p:nvSpPr>
-          <p:cNvPr id="12" name="Rectangle 11">
-            <a:extLst>
-              <a:ext uri="{FF2B5EF4-FFF2-40B4-BE49-F238E27FC236}">
-                <a16:creationId xmlns:a16="http://schemas.microsoft.com/office/drawing/2014/main" id="{0844A943-BF79-4FEA-ABB1-3BD54D236606}"/>
-              </a:ext>
-              <a:ext uri="{C183D7F6-B498-43B3-948B-1728B52AA6E4}">
-                <adec:decorative xmlns:adec="http://schemas.microsoft.com/office/drawing/2017/decorative" val="1"/>
-              </a:ext>
-            </a:extLst>
-          </p:cNvPr>
-          <p:cNvSpPr>
-            <a:spLocks noGrp="1" noRot="1" noChangeAspect="1" noMove="1" noResize="1" noEditPoints="1" noAdjustHandles="1" noChangeArrowheads="1" noChangeShapeType="1" noTextEdit="1"/>
-          </p:cNvSpPr>
-          <p:nvPr>
-            <p:extLst>
-              <p:ext uri="{386F3935-93C4-4BCD-93E2-E3B085C9AB24}">
-                <p16:designElem xmlns:p16="http://schemas.microsoft.com/office/powerpoint/2015/main" val="1"/>
-              </p:ext>
-            </p:extLst>
-          </p:nvPr>
-        </p:nvSpPr>
-        <p:spPr>
-          <a:xfrm rot="10800000" flipH="1">
-            <a:off x="0" y="6400799"/>
-            <a:ext cx="12192000" cy="456773"/>
-          </a:xfrm>
-          <a:prstGeom prst="rect">
-            <a:avLst/>
-          </a:prstGeom>
-          <a:gradFill>
-            <a:gsLst>
-              <a:gs pos="0">
-                <a:schemeClr val="accent1"/>
-              </a:gs>
-              <a:gs pos="90000">
-                <a:srgbClr val="000000"/>
-              </a:gs>
-            </a:gsLst>
-            <a:lin ang="2400000" scaled="0"/>
-          </a:gradFill>
-          <a:ln>
-            <a:noFill/>
-          </a:ln>
-        </p:spPr>
-        <p:style>
-          <a:lnRef idx="2">
-            <a:schemeClr val="accent1">
-              <a:shade val="50000"/>
-            </a:schemeClr>
-          </a:lnRef>
-          <a:fillRef idx="1">
-            <a:schemeClr val="accent1"/>
-          </a:fillRef>
-          <a:effectRef idx="0">
-            <a:schemeClr val="accent1"/>
-          </a:effectRef>
-          <a:fontRef idx="minor">
-            <a:schemeClr val="lt1"/>
-          </a:fontRef>
-        </p:style>
-        <p:txBody>
-          <a:bodyPr rtlCol="0" anchor="ctr"/>
-          <a:lstStyle/>
-          <a:p>
-            <a:pPr algn="ctr"/>
-            <a:endParaRPr lang="en-US"/>
-          </a:p>
-        </p:txBody>
-      </p:sp>
-      <p:sp>
-        <p:nvSpPr>
-          <p:cNvPr id="14" name="Rectangle 13">
-            <a:extLst>
-              <a:ext uri="{FF2B5EF4-FFF2-40B4-BE49-F238E27FC236}">
-                <a16:creationId xmlns:a16="http://schemas.microsoft.com/office/drawing/2014/main" id="{6437CC72-F4A8-4DC3-AFAB-D22C482C8100}"/>
-              </a:ext>
-              <a:ext uri="{C183D7F6-B498-43B3-948B-1728B52AA6E4}">
-                <adec:decorative xmlns:adec="http://schemas.microsoft.com/office/drawing/2017/decorative" val="1"/>
-              </a:ext>
-            </a:extLst>
-          </p:cNvPr>
-          <p:cNvSpPr>
-            <a:spLocks noGrp="1" noRot="1" noChangeAspect="1" noMove="1" noResize="1" noEditPoints="1" noAdjustHandles="1" noChangeArrowheads="1" noChangeShapeType="1" noTextEdit="1"/>
-          </p:cNvSpPr>
-          <p:nvPr>
-            <p:extLst>
-              <p:ext uri="{386F3935-93C4-4BCD-93E2-E3B085C9AB24}">
-                <p16:designElem xmlns:p16="http://schemas.microsoft.com/office/powerpoint/2015/main" val="1"/>
-              </p:ext>
-            </p:extLst>
-          </p:nvPr>
-        </p:nvSpPr>
-        <p:spPr>
-          <a:xfrm flipH="1">
-            <a:off x="4038600" y="6400799"/>
-            <a:ext cx="8153398" cy="456772"/>
-          </a:xfrm>
-          <a:prstGeom prst="rect">
-            <a:avLst/>
-          </a:prstGeom>
-          <a:gradFill>
-            <a:gsLst>
-              <a:gs pos="0">
-                <a:srgbClr val="000000">
-                  <a:alpha val="50000"/>
-                </a:srgbClr>
-              </a:gs>
-              <a:gs pos="100000">
-                <a:schemeClr val="accent1">
-                  <a:lumMod val="75000"/>
-                </a:schemeClr>
-              </a:gs>
-            </a:gsLst>
-            <a:lin ang="13800000" scaled="0"/>
-          </a:gradFill>
-          <a:ln>
-            <a:noFill/>
-          </a:ln>
-        </p:spPr>
-        <p:style>
-          <a:lnRef idx="2">
-            <a:schemeClr val="accent1">
-              <a:shade val="50000"/>
-            </a:schemeClr>
-          </a:lnRef>
-          <a:fillRef idx="1">
-            <a:schemeClr val="accent1"/>
-          </a:fillRef>
-          <a:effectRef idx="0">
-            <a:schemeClr val="accent1"/>
-          </a:effectRef>
-          <a:fontRef idx="minor">
-            <a:schemeClr val="lt1"/>
-          </a:fontRef>
-        </p:style>
-        <p:txBody>
-          <a:bodyPr rtlCol="0" anchor="ctr"/>
-          <a:lstStyle/>
-          <a:p>
-            <a:pPr algn="ctr"/>
-            <a:endParaRPr lang="en-US"/>
+            <a:endParaRPr lang="en-US" sz="2000" dirty="0">
+              <a:solidFill>
+                <a:srgbClr val="1D1C1D"/>
+              </a:solidFill>
+              <a:effectLst/>
+            </a:endParaRPr>
           </a:p>
         </p:txBody>
       </p:sp>
     </p:spTree>
     <p:extLst>
       <p:ext uri="{BB962C8B-B14F-4D97-AF65-F5344CB8AC3E}">
-        <p14:creationId xmlns:p14="http://schemas.microsoft.com/office/powerpoint/2010/main" val="3001573324"/>
+        <p14:creationId xmlns:p14="http://schemas.microsoft.com/office/powerpoint/2010/main" val="2642082695"/>
       </p:ext>
     </p:extLst>
   </p:cSld>

</xml_diff>

<commit_message>
neural networks added to paper
</commit_message>
<xml_diff>
--- a/presentation slides/CS613-FinalProject-Presentation.pptx
+++ b/presentation slides/CS613-FinalProject-Presentation.pptx
@@ -5651,39 +5651,7 @@
           <a:p>
             <a:r>
               <a:rPr lang="en-US" sz="1600" dirty="0"/>
-              <a:t>In our experiment, we chose the </a:t>
-            </a:r>
-            <a:r>
-              <a:rPr lang="en-US" sz="1600" dirty="0" err="1"/>
-              <a:t>pytorch</a:t>
-            </a:r>
-            <a:r>
-              <a:rPr lang="en-US" sz="1600" dirty="0"/>
-              <a:t> library to build a neural network for this classification task. The motivation was to use an available deep learning library that provides various </a:t>
-            </a:r>
-            <a:r>
-              <a:rPr lang="en-US" sz="1600" dirty="0" err="1"/>
-              <a:t>optmizers</a:t>
-            </a:r>
-            <a:r>
-              <a:rPr lang="en-US" sz="1600" dirty="0"/>
-              <a:t> and loss functions and an easy way to tune </a:t>
-            </a:r>
-            <a:r>
-              <a:rPr lang="en-US" sz="1600" dirty="0" err="1"/>
-              <a:t>hyperparamters</a:t>
-            </a:r>
-            <a:r>
-              <a:rPr lang="en-US" sz="1600" dirty="0"/>
-              <a:t> so we can arrive at the most accurate network. In this experiment we found that a neural network with 2 layers performed best with our data set of heart data. we ran the experiment with 8 -14 neurons in the first layer and 2 neurons in the final layer with the </a:t>
-            </a:r>
-            <a:r>
-              <a:rPr lang="en-US" sz="1600" dirty="0" err="1"/>
-              <a:t>leakyrelu</a:t>
-            </a:r>
-            <a:r>
-              <a:rPr lang="en-US" sz="1600" dirty="0"/>
-              <a:t> activation to predict the chances of heart failure.</a:t>
+              <a:t>In our experiment, we chose the PyTorch library to build a neural network for this classification task. The motivation was to use an available deep learning library that provides various optimizers and loss functions and an easy way to tune hyperparameters so we can arrive at the most accurate network. In this experiment we found that a neural network with 2 layers performed best with our data set of heart data. we ran the experiment with 8 -14 neurons in the first layer and 2 neurons in the final layer with the LeakyReLU activation to predict the chances of heart failure.</a:t>
             </a:r>
           </a:p>
           <a:p>
@@ -5701,15 +5669,7 @@
           <a:p>
             <a:r>
               <a:rPr lang="en-US" sz="1600" dirty="0"/>
-              <a:t>We were able to achieve a top accuracy of 86% over the test data with 12 neurons in the first layer and with optimizer set as </a:t>
-            </a:r>
-            <a:r>
-              <a:rPr lang="en-US" sz="1600" dirty="0" err="1"/>
-              <a:t>RMSProp</a:t>
-            </a:r>
-            <a:r>
-              <a:rPr lang="en-US" sz="1600" dirty="0"/>
-              <a:t>.</a:t>
+              <a:t>We were able to achieve a top accuracy of 86% over the test data with 12 neurons in the first layer and with optimizer set as RMSProp.</a:t>
             </a:r>
           </a:p>
           <a:p>

</xml_diff>

<commit_message>
EDA section added to slides
</commit_message>
<xml_diff>
--- a/presentation slides/CS613-FinalProject-Presentation.pptx
+++ b/presentation slides/CS613-FinalProject-Presentation.pptx
@@ -5,7 +5,7 @@
     <p:sldMasterId id="2147483648" r:id="rId1"/>
   </p:sldMasterIdLst>
   <p:notesMasterIdLst>
-    <p:notesMasterId r:id="rId19"/>
+    <p:notesMasterId r:id="rId21"/>
   </p:notesMasterIdLst>
   <p:sldIdLst>
     <p:sldId id="256" r:id="rId2"/>
@@ -19,12 +19,14 @@
     <p:sldId id="288" r:id="rId10"/>
     <p:sldId id="268" r:id="rId11"/>
     <p:sldId id="278" r:id="rId12"/>
-    <p:sldId id="279" r:id="rId13"/>
-    <p:sldId id="280" r:id="rId14"/>
-    <p:sldId id="262" r:id="rId15"/>
-    <p:sldId id="265" r:id="rId16"/>
-    <p:sldId id="270" r:id="rId17"/>
-    <p:sldId id="271" r:id="rId18"/>
+    <p:sldId id="289" r:id="rId13"/>
+    <p:sldId id="290" r:id="rId14"/>
+    <p:sldId id="279" r:id="rId15"/>
+    <p:sldId id="280" r:id="rId16"/>
+    <p:sldId id="262" r:id="rId17"/>
+    <p:sldId id="265" r:id="rId18"/>
+    <p:sldId id="270" r:id="rId19"/>
+    <p:sldId id="271" r:id="rId20"/>
   </p:sldIdLst>
   <p:sldSz cx="12192000" cy="6858000"/>
   <p:notesSz cx="6858000" cy="9144000"/>
@@ -5594,10 +5596,9 @@
           <a:lstStyle/>
           <a:p>
             <a:r>
-              <a:rPr lang="en-US" sz="4000" b="1"/>
-              <a:t>Results and Observations</a:t>
-            </a:r>
-            <a:endParaRPr lang="en-US" sz="4000" b="1" dirty="0"/>
+              <a:rPr lang="en-US" sz="4000" b="1" dirty="0"/>
+              <a:t>Exploratory Data Analysis</a:t>
+            </a:r>
           </a:p>
         </p:txBody>
       </p:sp>
@@ -5619,69 +5620,45 @@
         </p:nvSpPr>
         <p:spPr>
           <a:xfrm>
-            <a:off x="1136397" y="1890378"/>
-            <a:ext cx="9688296" cy="3782694"/>
+            <a:off x="1136397" y="2270234"/>
+            <a:ext cx="9688296" cy="3773213"/>
           </a:xfrm>
         </p:spPr>
         <p:txBody>
           <a:bodyPr anchor="t">
-            <a:normAutofit fontScale="92500" lnSpcReduction="10000"/>
+            <a:normAutofit/>
           </a:bodyPr>
           <a:lstStyle/>
           <a:p>
-            <a:pPr marL="457200" lvl="1" indent="0">
+            <a:pPr marL="0" indent="0">
               <a:buNone/>
             </a:pPr>
             <a:r>
-              <a:rPr lang="en-US" sz="2000" b="1" u="sng" dirty="0">
+              <a:rPr lang="en-US" sz="2400" dirty="0"/>
+              <a:t>Before training our models, we need to observe and analyze the data to see what we are going to work with. The goal here is to learn more about the data and become a topic export on the dataset you are working with.</a:t>
+            </a:r>
+          </a:p>
+          <a:p>
+            <a:pPr marL="0" indent="0">
+              <a:buNone/>
+            </a:pPr>
+            <a:endParaRPr lang="en-US" sz="2400" dirty="0"/>
+          </a:p>
+          <a:p>
+            <a:pPr marL="0" indent="0">
+              <a:buNone/>
+            </a:pPr>
+            <a:r>
+              <a:rPr lang="en-US" sz="2400" b="0" dirty="0">
                 <a:effectLst/>
               </a:rPr>
-              <a:t>Neural Network</a:t>
-            </a:r>
-          </a:p>
-          <a:p>
-            <a:pPr marL="0" indent="0">
+              <a:t>This data set includes a patient's medical data(resting heart rate, cholesterol levels, blood pressure, blood sugar levels, etc.). Our Goal in this section is to determine factors that contribute to heart failure and find correlation of various factors.</a:t>
+            </a:r>
+          </a:p>
+          <a:p>
+            <a:pPr marL="457200" lvl="1" indent="0">
               <a:buNone/>
             </a:pPr>
-            <a:r>
-              <a:rPr lang="en-US" sz="1600" dirty="0"/>
-              <a:t>Experiment</a:t>
-            </a:r>
-          </a:p>
-          <a:p>
-            <a:r>
-              <a:rPr lang="en-US" sz="1600" dirty="0"/>
-              <a:t>In our experiment, we chose the PyTorch library to build a neural network for this classification task. The motivation was to use an available deep learning library that provides various optimizers and loss functions and an easy way to tune hyperparameters so we can arrive at the most accurate network. In this experiment we found that a neural network with 2 layers performed best with our data set of heart data. we ran the experiment with 8 -14 neurons in the first layer and 2 neurons in the final layer with the LeakyReLU activation to predict the chances of heart failure.</a:t>
-            </a:r>
-          </a:p>
-          <a:p>
-            <a:endParaRPr lang="en-US" sz="1600" dirty="0"/>
-          </a:p>
-          <a:p>
-            <a:pPr marL="0" indent="0">
-              <a:buNone/>
-            </a:pPr>
-            <a:r>
-              <a:rPr lang="en-US" sz="1600" dirty="0"/>
-              <a:t>Observation</a:t>
-            </a:r>
-          </a:p>
-          <a:p>
-            <a:r>
-              <a:rPr lang="en-US" sz="1600" dirty="0"/>
-              <a:t>We were able to achieve a top accuracy of 86% over the test data with 12 neurons in the first layer and with optimizer set as RMSProp.</a:t>
-            </a:r>
-          </a:p>
-          <a:p>
-            <a:endParaRPr lang="en-US" sz="1600" dirty="0"/>
-          </a:p>
-          <a:p>
-            <a:pPr marL="0" indent="0">
-              <a:buNone/>
-            </a:pPr>
-            <a:br>
-              <a:rPr lang="en-US" sz="1600" dirty="0"/>
-            </a:br>
             <a:endParaRPr lang="en-US" sz="2000" dirty="0">
               <a:effectLst/>
             </a:endParaRPr>
@@ -5837,7 +5814,7 @@
     </p:spTree>
     <p:extLst>
       <p:ext uri="{BB962C8B-B14F-4D97-AF65-F5344CB8AC3E}">
-        <p14:creationId xmlns:p14="http://schemas.microsoft.com/office/powerpoint/2010/main" val="639892534"/>
+        <p14:creationId xmlns:p14="http://schemas.microsoft.com/office/powerpoint/2010/main" val="3263931852"/>
       </p:ext>
     </p:extLst>
   </p:cSld>
@@ -5978,7 +5955,7 @@
           <a:p>
             <a:r>
               <a:rPr lang="en-US" sz="4000" b="1" dirty="0"/>
-              <a:t>Future extensions of your work</a:t>
+              <a:t>Exploratory Data Analysis</a:t>
             </a:r>
           </a:p>
         </p:txBody>
@@ -6001,8 +5978,8 @@
         </p:nvSpPr>
         <p:spPr>
           <a:xfrm>
-            <a:off x="1136397" y="2418409"/>
-            <a:ext cx="9688296" cy="3782694"/>
+            <a:off x="1136397" y="2270235"/>
+            <a:ext cx="4797679" cy="957874"/>
           </a:xfrm>
         </p:spPr>
         <p:txBody>
@@ -6011,14 +5988,12 @@
           </a:bodyPr>
           <a:lstStyle/>
           <a:p>
-            <a:pPr marL="457200" lvl="1" indent="0">
+            <a:pPr marL="0" indent="0">
               <a:buNone/>
             </a:pPr>
             <a:r>
-              <a:rPr lang="en-US" sz="2000" dirty="0">
-                <a:effectLst/>
-              </a:rPr>
-              <a:t>Words…</a:t>
+              <a:rPr lang="en-US" sz="2000" dirty="0"/>
+              <a:t>We have 508 people with heart disease and 410 people without heart disease, so our problem is balanced.</a:t>
             </a:r>
           </a:p>
         </p:txBody>
@@ -6169,10 +6144,273 @@
           </a:p>
         </p:txBody>
       </p:sp>
+      <p:sp>
+        <p:nvSpPr>
+          <p:cNvPr id="9" name="Content Placeholder 2">
+            <a:extLst>
+              <a:ext uri="{FF2B5EF4-FFF2-40B4-BE49-F238E27FC236}">
+                <a16:creationId xmlns:a16="http://schemas.microsoft.com/office/drawing/2014/main" id="{0DA9B480-B2BF-22DE-12B6-4E7977EC9E50}"/>
+              </a:ext>
+            </a:extLst>
+          </p:cNvPr>
+          <p:cNvSpPr txBox="1">
+            <a:spLocks/>
+          </p:cNvSpPr>
+          <p:nvPr/>
+        </p:nvSpPr>
+        <p:spPr>
+          <a:xfrm>
+            <a:off x="6523575" y="2270235"/>
+            <a:ext cx="4797679" cy="769311"/>
+          </a:xfrm>
+          <a:prstGeom prst="rect">
+            <a:avLst/>
+          </a:prstGeom>
+        </p:spPr>
+        <p:txBody>
+          <a:bodyPr vert="horz" lIns="91440" tIns="45720" rIns="91440" bIns="45720" rtlCol="0" anchor="t">
+            <a:normAutofit/>
+          </a:bodyPr>
+          <a:lstStyle>
+            <a:lvl1pPr marL="228600" indent="-228600" algn="l" defTabSz="914400" rtl="0" eaLnBrk="1" latinLnBrk="0" hangingPunct="1">
+              <a:lnSpc>
+                <a:spcPct val="90000"/>
+              </a:lnSpc>
+              <a:spcBef>
+                <a:spcPts val="1000"/>
+              </a:spcBef>
+              <a:buFont typeface="Arial" panose="020B0604020202020204" pitchFamily="34" charset="0"/>
+              <a:buChar char="•"/>
+              <a:defRPr sz="2800" kern="1200">
+                <a:solidFill>
+                  <a:schemeClr val="tx1"/>
+                </a:solidFill>
+                <a:latin typeface="+mn-lt"/>
+                <a:ea typeface="+mn-ea"/>
+                <a:cs typeface="+mn-cs"/>
+              </a:defRPr>
+            </a:lvl1pPr>
+            <a:lvl2pPr marL="685800" indent="-228600" algn="l" defTabSz="914400" rtl="0" eaLnBrk="1" latinLnBrk="0" hangingPunct="1">
+              <a:lnSpc>
+                <a:spcPct val="90000"/>
+              </a:lnSpc>
+              <a:spcBef>
+                <a:spcPts val="500"/>
+              </a:spcBef>
+              <a:buFont typeface="Arial" panose="020B0604020202020204" pitchFamily="34" charset="0"/>
+              <a:buChar char="•"/>
+              <a:defRPr sz="2400" kern="1200">
+                <a:solidFill>
+                  <a:schemeClr val="tx1"/>
+                </a:solidFill>
+                <a:latin typeface="+mn-lt"/>
+                <a:ea typeface="+mn-ea"/>
+                <a:cs typeface="+mn-cs"/>
+              </a:defRPr>
+            </a:lvl2pPr>
+            <a:lvl3pPr marL="1143000" indent="-228600" algn="l" defTabSz="914400" rtl="0" eaLnBrk="1" latinLnBrk="0" hangingPunct="1">
+              <a:lnSpc>
+                <a:spcPct val="90000"/>
+              </a:lnSpc>
+              <a:spcBef>
+                <a:spcPts val="500"/>
+              </a:spcBef>
+              <a:buFont typeface="Arial" panose="020B0604020202020204" pitchFamily="34" charset="0"/>
+              <a:buChar char="•"/>
+              <a:defRPr sz="2000" kern="1200">
+                <a:solidFill>
+                  <a:schemeClr val="tx1"/>
+                </a:solidFill>
+                <a:latin typeface="+mn-lt"/>
+                <a:ea typeface="+mn-ea"/>
+                <a:cs typeface="+mn-cs"/>
+              </a:defRPr>
+            </a:lvl3pPr>
+            <a:lvl4pPr marL="1600200" indent="-228600" algn="l" defTabSz="914400" rtl="0" eaLnBrk="1" latinLnBrk="0" hangingPunct="1">
+              <a:lnSpc>
+                <a:spcPct val="90000"/>
+              </a:lnSpc>
+              <a:spcBef>
+                <a:spcPts val="500"/>
+              </a:spcBef>
+              <a:buFont typeface="Arial" panose="020B0604020202020204" pitchFamily="34" charset="0"/>
+              <a:buChar char="•"/>
+              <a:defRPr sz="1800" kern="1200">
+                <a:solidFill>
+                  <a:schemeClr val="tx1"/>
+                </a:solidFill>
+                <a:latin typeface="+mn-lt"/>
+                <a:ea typeface="+mn-ea"/>
+                <a:cs typeface="+mn-cs"/>
+              </a:defRPr>
+            </a:lvl4pPr>
+            <a:lvl5pPr marL="2057400" indent="-228600" algn="l" defTabSz="914400" rtl="0" eaLnBrk="1" latinLnBrk="0" hangingPunct="1">
+              <a:lnSpc>
+                <a:spcPct val="90000"/>
+              </a:lnSpc>
+              <a:spcBef>
+                <a:spcPts val="500"/>
+              </a:spcBef>
+              <a:buFont typeface="Arial" panose="020B0604020202020204" pitchFamily="34" charset="0"/>
+              <a:buChar char="•"/>
+              <a:defRPr sz="1800" kern="1200">
+                <a:solidFill>
+                  <a:schemeClr val="tx1"/>
+                </a:solidFill>
+                <a:latin typeface="+mn-lt"/>
+                <a:ea typeface="+mn-ea"/>
+                <a:cs typeface="+mn-cs"/>
+              </a:defRPr>
+            </a:lvl5pPr>
+            <a:lvl6pPr marL="2514600" indent="-228600" algn="l" defTabSz="914400" rtl="0" eaLnBrk="1" latinLnBrk="0" hangingPunct="1">
+              <a:lnSpc>
+                <a:spcPct val="90000"/>
+              </a:lnSpc>
+              <a:spcBef>
+                <a:spcPts val="500"/>
+              </a:spcBef>
+              <a:buFont typeface="Arial" panose="020B0604020202020204" pitchFamily="34" charset="0"/>
+              <a:buChar char="•"/>
+              <a:defRPr sz="1800" kern="1200">
+                <a:solidFill>
+                  <a:schemeClr val="tx1"/>
+                </a:solidFill>
+                <a:latin typeface="+mn-lt"/>
+                <a:ea typeface="+mn-ea"/>
+                <a:cs typeface="+mn-cs"/>
+              </a:defRPr>
+            </a:lvl6pPr>
+            <a:lvl7pPr marL="2971800" indent="-228600" algn="l" defTabSz="914400" rtl="0" eaLnBrk="1" latinLnBrk="0" hangingPunct="1">
+              <a:lnSpc>
+                <a:spcPct val="90000"/>
+              </a:lnSpc>
+              <a:spcBef>
+                <a:spcPts val="500"/>
+              </a:spcBef>
+              <a:buFont typeface="Arial" panose="020B0604020202020204" pitchFamily="34" charset="0"/>
+              <a:buChar char="•"/>
+              <a:defRPr sz="1800" kern="1200">
+                <a:solidFill>
+                  <a:schemeClr val="tx1"/>
+                </a:solidFill>
+                <a:latin typeface="+mn-lt"/>
+                <a:ea typeface="+mn-ea"/>
+                <a:cs typeface="+mn-cs"/>
+              </a:defRPr>
+            </a:lvl7pPr>
+            <a:lvl8pPr marL="3429000" indent="-228600" algn="l" defTabSz="914400" rtl="0" eaLnBrk="1" latinLnBrk="0" hangingPunct="1">
+              <a:lnSpc>
+                <a:spcPct val="90000"/>
+              </a:lnSpc>
+              <a:spcBef>
+                <a:spcPts val="500"/>
+              </a:spcBef>
+              <a:buFont typeface="Arial" panose="020B0604020202020204" pitchFamily="34" charset="0"/>
+              <a:buChar char="•"/>
+              <a:defRPr sz="1800" kern="1200">
+                <a:solidFill>
+                  <a:schemeClr val="tx1"/>
+                </a:solidFill>
+                <a:latin typeface="+mn-lt"/>
+                <a:ea typeface="+mn-ea"/>
+                <a:cs typeface="+mn-cs"/>
+              </a:defRPr>
+            </a:lvl8pPr>
+            <a:lvl9pPr marL="3886200" indent="-228600" algn="l" defTabSz="914400" rtl="0" eaLnBrk="1" latinLnBrk="0" hangingPunct="1">
+              <a:lnSpc>
+                <a:spcPct val="90000"/>
+              </a:lnSpc>
+              <a:spcBef>
+                <a:spcPts val="500"/>
+              </a:spcBef>
+              <a:buFont typeface="Arial" panose="020B0604020202020204" pitchFamily="34" charset="0"/>
+              <a:buChar char="•"/>
+              <a:defRPr sz="1800" kern="1200">
+                <a:solidFill>
+                  <a:schemeClr val="tx1"/>
+                </a:solidFill>
+                <a:latin typeface="+mn-lt"/>
+                <a:ea typeface="+mn-ea"/>
+                <a:cs typeface="+mn-cs"/>
+              </a:defRPr>
+            </a:lvl9pPr>
+          </a:lstStyle>
+          <a:p>
+            <a:pPr marL="0" indent="0">
+              <a:buFont typeface="Arial" panose="020B0604020202020204" pitchFamily="34" charset="0"/>
+              <a:buNone/>
+            </a:pPr>
+            <a:r>
+              <a:rPr lang="en-US" sz="2000" dirty="0"/>
+              <a:t>This dataset looks perfect to use as we don’t have null values.</a:t>
+            </a:r>
+          </a:p>
+        </p:txBody>
+      </p:sp>
+      <p:pic>
+        <p:nvPicPr>
+          <p:cNvPr id="14" name="Picture 13" descr="A picture containing text, screenshot, rectangle, display&#10;&#10;Description automatically generated">
+            <a:extLst>
+              <a:ext uri="{FF2B5EF4-FFF2-40B4-BE49-F238E27FC236}">
+                <a16:creationId xmlns:a16="http://schemas.microsoft.com/office/drawing/2014/main" id="{0DAFAE32-CF5A-256E-524E-FA417459D0C2}"/>
+              </a:ext>
+            </a:extLst>
+          </p:cNvPr>
+          <p:cNvPicPr>
+            <a:picLocks noChangeAspect="1"/>
+          </p:cNvPicPr>
+          <p:nvPr/>
+        </p:nvPicPr>
+        <p:blipFill>
+          <a:blip r:embed="rId2"/>
+          <a:stretch>
+            <a:fillRect/>
+          </a:stretch>
+        </p:blipFill>
+        <p:spPr>
+          <a:xfrm>
+            <a:off x="1611239" y="3228109"/>
+            <a:ext cx="3834054" cy="2964873"/>
+          </a:xfrm>
+          <a:prstGeom prst="rect">
+            <a:avLst/>
+          </a:prstGeom>
+        </p:spPr>
+      </p:pic>
+      <p:pic>
+        <p:nvPicPr>
+          <p:cNvPr id="16" name="Picture 15" descr="A screenshot of a computer program&#10;&#10;Description automatically generated with medium confidence">
+            <a:extLst>
+              <a:ext uri="{FF2B5EF4-FFF2-40B4-BE49-F238E27FC236}">
+                <a16:creationId xmlns:a16="http://schemas.microsoft.com/office/drawing/2014/main" id="{BAB32BA9-01A5-5B9E-AA86-AB6037772E73}"/>
+              </a:ext>
+            </a:extLst>
+          </p:cNvPr>
+          <p:cNvPicPr>
+            <a:picLocks noChangeAspect="1"/>
+          </p:cNvPicPr>
+          <p:nvPr/>
+        </p:nvPicPr>
+        <p:blipFill>
+          <a:blip r:embed="rId3"/>
+          <a:stretch>
+            <a:fillRect/>
+          </a:stretch>
+        </p:blipFill>
+        <p:spPr>
+          <a:xfrm>
+            <a:off x="7545315" y="3082330"/>
+            <a:ext cx="2505217" cy="3039571"/>
+          </a:xfrm>
+          <a:prstGeom prst="rect">
+            <a:avLst/>
+          </a:prstGeom>
+        </p:spPr>
+      </p:pic>
     </p:spTree>
     <p:extLst>
       <p:ext uri="{BB962C8B-B14F-4D97-AF65-F5344CB8AC3E}">
-        <p14:creationId xmlns:p14="http://schemas.microsoft.com/office/powerpoint/2010/main" val="1396956347"/>
+        <p14:creationId xmlns:p14="http://schemas.microsoft.com/office/powerpoint/2010/main" val="1625597915"/>
       </p:ext>
     </p:extLst>
   </p:cSld>
@@ -6288,6 +6526,724 @@
           <p:cNvPr id="2" name="Title 1">
             <a:extLst>
               <a:ext uri="{FF2B5EF4-FFF2-40B4-BE49-F238E27FC236}">
+                <a16:creationId xmlns:a16="http://schemas.microsoft.com/office/drawing/2014/main" id="{5C4F02F6-349D-954F-B02F-78EBD3017252}"/>
+              </a:ext>
+            </a:extLst>
+          </p:cNvPr>
+          <p:cNvSpPr>
+            <a:spLocks noGrp="1"/>
+          </p:cNvSpPr>
+          <p:nvPr>
+            <p:ph type="title"/>
+          </p:nvPr>
+        </p:nvSpPr>
+        <p:spPr>
+          <a:xfrm>
+            <a:off x="1136397" y="502022"/>
+            <a:ext cx="9688296" cy="1388356"/>
+          </a:xfrm>
+        </p:spPr>
+        <p:txBody>
+          <a:bodyPr anchor="b">
+            <a:normAutofit/>
+          </a:bodyPr>
+          <a:lstStyle/>
+          <a:p>
+            <a:r>
+              <a:rPr lang="en-US" sz="4000" b="1"/>
+              <a:t>Results and Observations</a:t>
+            </a:r>
+            <a:endParaRPr lang="en-US" sz="4000" b="1" dirty="0"/>
+          </a:p>
+        </p:txBody>
+      </p:sp>
+      <p:sp>
+        <p:nvSpPr>
+          <p:cNvPr id="3" name="Content Placeholder 2">
+            <a:extLst>
+              <a:ext uri="{FF2B5EF4-FFF2-40B4-BE49-F238E27FC236}">
+                <a16:creationId xmlns:a16="http://schemas.microsoft.com/office/drawing/2014/main" id="{3A721E59-1DC4-3845-9DB3-10F69E64143F}"/>
+              </a:ext>
+            </a:extLst>
+          </p:cNvPr>
+          <p:cNvSpPr>
+            <a:spLocks noGrp="1"/>
+          </p:cNvSpPr>
+          <p:nvPr>
+            <p:ph idx="1"/>
+          </p:nvPr>
+        </p:nvSpPr>
+        <p:spPr>
+          <a:xfrm>
+            <a:off x="1136397" y="1890378"/>
+            <a:ext cx="9688296" cy="3782694"/>
+          </a:xfrm>
+        </p:spPr>
+        <p:txBody>
+          <a:bodyPr anchor="t">
+            <a:normAutofit fontScale="92500" lnSpcReduction="10000"/>
+          </a:bodyPr>
+          <a:lstStyle/>
+          <a:p>
+            <a:pPr marL="457200" lvl="1" indent="0">
+              <a:buNone/>
+            </a:pPr>
+            <a:r>
+              <a:rPr lang="en-US" sz="2000" b="1" u="sng" dirty="0">
+                <a:effectLst/>
+              </a:rPr>
+              <a:t>Neural Network</a:t>
+            </a:r>
+          </a:p>
+          <a:p>
+            <a:pPr marL="0" indent="0">
+              <a:buNone/>
+            </a:pPr>
+            <a:r>
+              <a:rPr lang="en-US" sz="1600" dirty="0"/>
+              <a:t>Experiment</a:t>
+            </a:r>
+          </a:p>
+          <a:p>
+            <a:r>
+              <a:rPr lang="en-US" sz="1600" dirty="0"/>
+              <a:t>In our experiment, we chose the PyTorch library to build a neural network for this classification task. The motivation was to use an available deep learning library that provides various optimizers and loss functions and an easy way to tune hyperparameters so we can arrive at the most accurate network. In this experiment we found that a neural network with 2 layers performed best with our data set of heart data. we ran the experiment with 8 -14 neurons in the first layer and 2 neurons in the final layer with the LeakyReLU activation to predict the chances of heart failure.</a:t>
+            </a:r>
+          </a:p>
+          <a:p>
+            <a:endParaRPr lang="en-US" sz="1600" dirty="0"/>
+          </a:p>
+          <a:p>
+            <a:pPr marL="0" indent="0">
+              <a:buNone/>
+            </a:pPr>
+            <a:r>
+              <a:rPr lang="en-US" sz="1600" dirty="0"/>
+              <a:t>Observation</a:t>
+            </a:r>
+          </a:p>
+          <a:p>
+            <a:r>
+              <a:rPr lang="en-US" sz="1600" dirty="0"/>
+              <a:t>We were able to achieve a top accuracy of 86% over the test data with 12 neurons in the first layer and with optimizer set as RMSProp.</a:t>
+            </a:r>
+          </a:p>
+          <a:p>
+            <a:endParaRPr lang="en-US" sz="1600" dirty="0"/>
+          </a:p>
+          <a:p>
+            <a:pPr marL="0" indent="0">
+              <a:buNone/>
+            </a:pPr>
+            <a:br>
+              <a:rPr lang="en-US" sz="1600" dirty="0"/>
+            </a:br>
+            <a:endParaRPr lang="en-US" sz="2000" dirty="0">
+              <a:effectLst/>
+            </a:endParaRPr>
+          </a:p>
+        </p:txBody>
+      </p:sp>
+      <p:sp>
+        <p:nvSpPr>
+          <p:cNvPr id="10" name="Rectangle 9">
+            <a:extLst>
+              <a:ext uri="{FF2B5EF4-FFF2-40B4-BE49-F238E27FC236}">
+                <a16:creationId xmlns:a16="http://schemas.microsoft.com/office/drawing/2014/main" id="{EEBF1590-3B36-48EE-A89D-3B6F3CB256AB}"/>
+              </a:ext>
+              <a:ext uri="{C183D7F6-B498-43B3-948B-1728B52AA6E4}">
+                <adec:decorative xmlns:adec="http://schemas.microsoft.com/office/drawing/2017/decorative" val="1"/>
+              </a:ext>
+            </a:extLst>
+          </p:cNvPr>
+          <p:cNvSpPr>
+            <a:spLocks noGrp="1" noRot="1" noChangeAspect="1" noMove="1" noResize="1" noEditPoints="1" noAdjustHandles="1" noChangeArrowheads="1" noChangeShapeType="1" noTextEdit="1"/>
+          </p:cNvSpPr>
+          <p:nvPr>
+            <p:extLst>
+              <p:ext uri="{386F3935-93C4-4BCD-93E2-E3B085C9AB24}">
+                <p16:designElem xmlns:p16="http://schemas.microsoft.com/office/powerpoint/2015/main" val="1"/>
+              </p:ext>
+            </p:extLst>
+          </p:nvPr>
+        </p:nvSpPr>
+        <p:spPr>
+          <a:xfrm rot="10800000" flipH="1">
+            <a:off x="0" y="6400799"/>
+            <a:ext cx="12192000" cy="456773"/>
+          </a:xfrm>
+          <a:prstGeom prst="rect">
+            <a:avLst/>
+          </a:prstGeom>
+          <a:gradFill>
+            <a:gsLst>
+              <a:gs pos="0">
+                <a:schemeClr val="accent1"/>
+              </a:gs>
+              <a:gs pos="78000">
+                <a:srgbClr val="000000"/>
+              </a:gs>
+            </a:gsLst>
+            <a:lin ang="2400000" scaled="0"/>
+          </a:gradFill>
+          <a:ln>
+            <a:noFill/>
+          </a:ln>
+        </p:spPr>
+        <p:style>
+          <a:lnRef idx="2">
+            <a:schemeClr val="accent1">
+              <a:shade val="50000"/>
+            </a:schemeClr>
+          </a:lnRef>
+          <a:fillRef idx="1">
+            <a:schemeClr val="accent1"/>
+          </a:fillRef>
+          <a:effectRef idx="0">
+            <a:schemeClr val="accent1"/>
+          </a:effectRef>
+          <a:fontRef idx="minor">
+            <a:schemeClr val="lt1"/>
+          </a:fontRef>
+        </p:style>
+        <p:txBody>
+          <a:bodyPr rtlCol="0" anchor="ctr"/>
+          <a:lstStyle/>
+          <a:p>
+            <a:pPr algn="ctr"/>
+            <a:endParaRPr lang="en-US"/>
+          </a:p>
+        </p:txBody>
+      </p:sp>
+      <p:sp>
+        <p:nvSpPr>
+          <p:cNvPr id="12" name="Rectangle 11">
+            <a:extLst>
+              <a:ext uri="{FF2B5EF4-FFF2-40B4-BE49-F238E27FC236}">
+                <a16:creationId xmlns:a16="http://schemas.microsoft.com/office/drawing/2014/main" id="{AC8F6C8C-AB5A-4548-942D-E3FD40ACBC49}"/>
+              </a:ext>
+              <a:ext uri="{C183D7F6-B498-43B3-948B-1728B52AA6E4}">
+                <adec:decorative xmlns:adec="http://schemas.microsoft.com/office/drawing/2017/decorative" val="1"/>
+              </a:ext>
+            </a:extLst>
+          </p:cNvPr>
+          <p:cNvSpPr>
+            <a:spLocks noGrp="1" noRot="1" noChangeAspect="1" noMove="1" noResize="1" noEditPoints="1" noAdjustHandles="1" noChangeArrowheads="1" noChangeShapeType="1" noTextEdit="1"/>
+          </p:cNvSpPr>
+          <p:nvPr>
+            <p:extLst>
+              <p:ext uri="{386F3935-93C4-4BCD-93E2-E3B085C9AB24}">
+                <p16:designElem xmlns:p16="http://schemas.microsoft.com/office/powerpoint/2015/main" val="1"/>
+              </p:ext>
+            </p:extLst>
+          </p:nvPr>
+        </p:nvSpPr>
+        <p:spPr>
+          <a:xfrm flipH="1">
+            <a:off x="4038600" y="6400799"/>
+            <a:ext cx="8153398" cy="456772"/>
+          </a:xfrm>
+          <a:prstGeom prst="rect">
+            <a:avLst/>
+          </a:prstGeom>
+          <a:gradFill>
+            <a:gsLst>
+              <a:gs pos="0">
+                <a:srgbClr val="000000">
+                  <a:alpha val="63000"/>
+                </a:srgbClr>
+              </a:gs>
+              <a:gs pos="100000">
+                <a:schemeClr val="accent1">
+                  <a:lumMod val="75000"/>
+                </a:schemeClr>
+              </a:gs>
+            </a:gsLst>
+            <a:lin ang="13800000" scaled="0"/>
+          </a:gradFill>
+          <a:ln>
+            <a:noFill/>
+          </a:ln>
+        </p:spPr>
+        <p:style>
+          <a:lnRef idx="2">
+            <a:schemeClr val="accent1">
+              <a:shade val="50000"/>
+            </a:schemeClr>
+          </a:lnRef>
+          <a:fillRef idx="1">
+            <a:schemeClr val="accent1"/>
+          </a:fillRef>
+          <a:effectRef idx="0">
+            <a:schemeClr val="accent1"/>
+          </a:effectRef>
+          <a:fontRef idx="minor">
+            <a:schemeClr val="lt1"/>
+          </a:fontRef>
+        </p:style>
+        <p:txBody>
+          <a:bodyPr rtlCol="0" anchor="ctr"/>
+          <a:lstStyle/>
+          <a:p>
+            <a:pPr algn="ctr"/>
+            <a:endParaRPr lang="en-US"/>
+          </a:p>
+        </p:txBody>
+      </p:sp>
+    </p:spTree>
+    <p:extLst>
+      <p:ext uri="{BB962C8B-B14F-4D97-AF65-F5344CB8AC3E}">
+        <p14:creationId xmlns:p14="http://schemas.microsoft.com/office/powerpoint/2010/main" val="639892534"/>
+      </p:ext>
+    </p:extLst>
+  </p:cSld>
+  <p:clrMapOvr>
+    <a:masterClrMapping/>
+  </p:clrMapOvr>
+</p:sld>
+</file>
+
+<file path=ppt/slides/slide15.xml><?xml version="1.0" encoding="utf-8"?>
+<p:sld xmlns:a="http://schemas.openxmlformats.org/drawingml/2006/main" xmlns:r="http://schemas.openxmlformats.org/officeDocument/2006/relationships" xmlns:p="http://schemas.openxmlformats.org/presentationml/2006/main">
+  <p:cSld>
+    <p:bg>
+      <p:bgPr>
+        <a:solidFill>
+          <a:schemeClr val="bg1"/>
+        </a:solidFill>
+        <a:effectLst/>
+      </p:bgPr>
+    </p:bg>
+    <p:spTree>
+      <p:nvGrpSpPr>
+        <p:cNvPr id="1" name=""/>
+        <p:cNvGrpSpPr/>
+        <p:nvPr/>
+      </p:nvGrpSpPr>
+      <p:grpSpPr>
+        <a:xfrm>
+          <a:off x="0" y="0"/>
+          <a:ext cx="0" cy="0"/>
+          <a:chOff x="0" y="0"/>
+          <a:chExt cx="0" cy="0"/>
+        </a:xfrm>
+      </p:grpSpPr>
+      <p:sp useBgFill="1">
+        <p:nvSpPr>
+          <p:cNvPr id="8" name="Rectangle 7">
+            <a:extLst>
+              <a:ext uri="{FF2B5EF4-FFF2-40B4-BE49-F238E27FC236}">
+                <a16:creationId xmlns:a16="http://schemas.microsoft.com/office/drawing/2014/main" id="{979E27D9-03C7-44E2-9FF8-15D0C8506AF7}"/>
+              </a:ext>
+              <a:ext uri="{C183D7F6-B498-43B3-948B-1728B52AA6E4}">
+                <adec:decorative xmlns:adec="http://schemas.microsoft.com/office/drawing/2017/decorative" val="1"/>
+              </a:ext>
+            </a:extLst>
+          </p:cNvPr>
+          <p:cNvSpPr>
+            <a:spLocks noGrp="1" noRot="1" noChangeAspect="1" noMove="1" noResize="1" noEditPoints="1" noAdjustHandles="1" noChangeArrowheads="1" noChangeShapeType="1" noTextEdit="1"/>
+          </p:cNvSpPr>
+          <p:nvPr>
+            <p:extLst>
+              <p:ext uri="{386F3935-93C4-4BCD-93E2-E3B085C9AB24}">
+                <p16:designElem xmlns:p16="http://schemas.microsoft.com/office/powerpoint/2015/main" val="1"/>
+              </p:ext>
+            </p:extLst>
+          </p:nvPr>
+        </p:nvSpPr>
+        <p:spPr>
+          <a:xfrm>
+            <a:off x="0" y="0"/>
+            <a:ext cx="12192000" cy="6858000"/>
+          </a:xfrm>
+          <a:prstGeom prst="rect">
+            <a:avLst/>
+          </a:prstGeom>
+          <a:ln w="12700" cap="flat" cmpd="sng" algn="ctr">
+            <a:noFill/>
+            <a:prstDash val="solid"/>
+            <a:miter lim="800000"/>
+          </a:ln>
+          <a:effectLst/>
+          <a:extLst>
+            <a:ext uri="{91240B29-F687-4F45-9708-019B960494DF}">
+              <a14:hiddenLine xmlns:a14="http://schemas.microsoft.com/office/drawing/2010/main" w="12700" cap="flat" cmpd="sng" algn="ctr">
+                <a:solidFill>
+                  <a:schemeClr val="accent1">
+                    <a:shade val="50000"/>
+                  </a:schemeClr>
+                </a:solidFill>
+                <a:prstDash val="solid"/>
+                <a:miter lim="800000"/>
+              </a14:hiddenLine>
+            </a:ext>
+          </a:extLst>
+        </p:spPr>
+        <p:style>
+          <a:lnRef idx="2">
+            <a:schemeClr val="accent1">
+              <a:shade val="50000"/>
+            </a:schemeClr>
+          </a:lnRef>
+          <a:fillRef idx="1">
+            <a:schemeClr val="accent1"/>
+          </a:fillRef>
+          <a:effectRef idx="0">
+            <a:schemeClr val="accent1"/>
+          </a:effectRef>
+          <a:fontRef idx="minor">
+            <a:schemeClr val="lt1"/>
+          </a:fontRef>
+        </p:style>
+        <p:txBody>
+          <a:bodyPr rtlCol="0" anchor="ctr"/>
+          <a:lstStyle/>
+          <a:p>
+            <a:pPr algn="ctr"/>
+            <a:endParaRPr lang="en-US"/>
+          </a:p>
+        </p:txBody>
+      </p:sp>
+      <p:sp>
+        <p:nvSpPr>
+          <p:cNvPr id="2" name="Title 1">
+            <a:extLst>
+              <a:ext uri="{FF2B5EF4-FFF2-40B4-BE49-F238E27FC236}">
+                <a16:creationId xmlns:a16="http://schemas.microsoft.com/office/drawing/2014/main" id="{5C4F02F6-349D-954F-B02F-78EBD3017252}"/>
+              </a:ext>
+            </a:extLst>
+          </p:cNvPr>
+          <p:cNvSpPr>
+            <a:spLocks noGrp="1"/>
+          </p:cNvSpPr>
+          <p:nvPr>
+            <p:ph type="title"/>
+          </p:nvPr>
+        </p:nvSpPr>
+        <p:spPr>
+          <a:xfrm>
+            <a:off x="1136397" y="502022"/>
+            <a:ext cx="9688296" cy="1388356"/>
+          </a:xfrm>
+        </p:spPr>
+        <p:txBody>
+          <a:bodyPr anchor="b">
+            <a:normAutofit/>
+          </a:bodyPr>
+          <a:lstStyle/>
+          <a:p>
+            <a:r>
+              <a:rPr lang="en-US" sz="4000" b="1" dirty="0"/>
+              <a:t>Future extensions of your work</a:t>
+            </a:r>
+          </a:p>
+        </p:txBody>
+      </p:sp>
+      <p:sp>
+        <p:nvSpPr>
+          <p:cNvPr id="3" name="Content Placeholder 2">
+            <a:extLst>
+              <a:ext uri="{FF2B5EF4-FFF2-40B4-BE49-F238E27FC236}">
+                <a16:creationId xmlns:a16="http://schemas.microsoft.com/office/drawing/2014/main" id="{3A721E59-1DC4-3845-9DB3-10F69E64143F}"/>
+              </a:ext>
+            </a:extLst>
+          </p:cNvPr>
+          <p:cNvSpPr>
+            <a:spLocks noGrp="1"/>
+          </p:cNvSpPr>
+          <p:nvPr>
+            <p:ph idx="1"/>
+          </p:nvPr>
+        </p:nvSpPr>
+        <p:spPr>
+          <a:xfrm>
+            <a:off x="1136397" y="2418409"/>
+            <a:ext cx="9688296" cy="3782694"/>
+          </a:xfrm>
+        </p:spPr>
+        <p:txBody>
+          <a:bodyPr anchor="t">
+            <a:normAutofit/>
+          </a:bodyPr>
+          <a:lstStyle/>
+          <a:p>
+            <a:pPr marL="457200" lvl="1" indent="0">
+              <a:buNone/>
+            </a:pPr>
+            <a:r>
+              <a:rPr lang="en-US" sz="2000" dirty="0">
+                <a:effectLst/>
+              </a:rPr>
+              <a:t>Words…</a:t>
+            </a:r>
+          </a:p>
+        </p:txBody>
+      </p:sp>
+      <p:sp>
+        <p:nvSpPr>
+          <p:cNvPr id="10" name="Rectangle 9">
+            <a:extLst>
+              <a:ext uri="{FF2B5EF4-FFF2-40B4-BE49-F238E27FC236}">
+                <a16:creationId xmlns:a16="http://schemas.microsoft.com/office/drawing/2014/main" id="{EEBF1590-3B36-48EE-A89D-3B6F3CB256AB}"/>
+              </a:ext>
+              <a:ext uri="{C183D7F6-B498-43B3-948B-1728B52AA6E4}">
+                <adec:decorative xmlns:adec="http://schemas.microsoft.com/office/drawing/2017/decorative" val="1"/>
+              </a:ext>
+            </a:extLst>
+          </p:cNvPr>
+          <p:cNvSpPr>
+            <a:spLocks noGrp="1" noRot="1" noChangeAspect="1" noMove="1" noResize="1" noEditPoints="1" noAdjustHandles="1" noChangeArrowheads="1" noChangeShapeType="1" noTextEdit="1"/>
+          </p:cNvSpPr>
+          <p:nvPr>
+            <p:extLst>
+              <p:ext uri="{386F3935-93C4-4BCD-93E2-E3B085C9AB24}">
+                <p16:designElem xmlns:p16="http://schemas.microsoft.com/office/powerpoint/2015/main" val="1"/>
+              </p:ext>
+            </p:extLst>
+          </p:nvPr>
+        </p:nvSpPr>
+        <p:spPr>
+          <a:xfrm rot="10800000" flipH="1">
+            <a:off x="0" y="6400799"/>
+            <a:ext cx="12192000" cy="456773"/>
+          </a:xfrm>
+          <a:prstGeom prst="rect">
+            <a:avLst/>
+          </a:prstGeom>
+          <a:gradFill>
+            <a:gsLst>
+              <a:gs pos="0">
+                <a:schemeClr val="accent1"/>
+              </a:gs>
+              <a:gs pos="78000">
+                <a:srgbClr val="000000"/>
+              </a:gs>
+            </a:gsLst>
+            <a:lin ang="2400000" scaled="0"/>
+          </a:gradFill>
+          <a:ln>
+            <a:noFill/>
+          </a:ln>
+        </p:spPr>
+        <p:style>
+          <a:lnRef idx="2">
+            <a:schemeClr val="accent1">
+              <a:shade val="50000"/>
+            </a:schemeClr>
+          </a:lnRef>
+          <a:fillRef idx="1">
+            <a:schemeClr val="accent1"/>
+          </a:fillRef>
+          <a:effectRef idx="0">
+            <a:schemeClr val="accent1"/>
+          </a:effectRef>
+          <a:fontRef idx="minor">
+            <a:schemeClr val="lt1"/>
+          </a:fontRef>
+        </p:style>
+        <p:txBody>
+          <a:bodyPr rtlCol="0" anchor="ctr"/>
+          <a:lstStyle/>
+          <a:p>
+            <a:pPr algn="ctr"/>
+            <a:endParaRPr lang="en-US"/>
+          </a:p>
+        </p:txBody>
+      </p:sp>
+      <p:sp>
+        <p:nvSpPr>
+          <p:cNvPr id="12" name="Rectangle 11">
+            <a:extLst>
+              <a:ext uri="{FF2B5EF4-FFF2-40B4-BE49-F238E27FC236}">
+                <a16:creationId xmlns:a16="http://schemas.microsoft.com/office/drawing/2014/main" id="{AC8F6C8C-AB5A-4548-942D-E3FD40ACBC49}"/>
+              </a:ext>
+              <a:ext uri="{C183D7F6-B498-43B3-948B-1728B52AA6E4}">
+                <adec:decorative xmlns:adec="http://schemas.microsoft.com/office/drawing/2017/decorative" val="1"/>
+              </a:ext>
+            </a:extLst>
+          </p:cNvPr>
+          <p:cNvSpPr>
+            <a:spLocks noGrp="1" noRot="1" noChangeAspect="1" noMove="1" noResize="1" noEditPoints="1" noAdjustHandles="1" noChangeArrowheads="1" noChangeShapeType="1" noTextEdit="1"/>
+          </p:cNvSpPr>
+          <p:nvPr>
+            <p:extLst>
+              <p:ext uri="{386F3935-93C4-4BCD-93E2-E3B085C9AB24}">
+                <p16:designElem xmlns:p16="http://schemas.microsoft.com/office/powerpoint/2015/main" val="1"/>
+              </p:ext>
+            </p:extLst>
+          </p:nvPr>
+        </p:nvSpPr>
+        <p:spPr>
+          <a:xfrm flipH="1">
+            <a:off x="4038600" y="6400799"/>
+            <a:ext cx="8153398" cy="456772"/>
+          </a:xfrm>
+          <a:prstGeom prst="rect">
+            <a:avLst/>
+          </a:prstGeom>
+          <a:gradFill>
+            <a:gsLst>
+              <a:gs pos="0">
+                <a:srgbClr val="000000">
+                  <a:alpha val="63000"/>
+                </a:srgbClr>
+              </a:gs>
+              <a:gs pos="100000">
+                <a:schemeClr val="accent1">
+                  <a:lumMod val="75000"/>
+                </a:schemeClr>
+              </a:gs>
+            </a:gsLst>
+            <a:lin ang="13800000" scaled="0"/>
+          </a:gradFill>
+          <a:ln>
+            <a:noFill/>
+          </a:ln>
+        </p:spPr>
+        <p:style>
+          <a:lnRef idx="2">
+            <a:schemeClr val="accent1">
+              <a:shade val="50000"/>
+            </a:schemeClr>
+          </a:lnRef>
+          <a:fillRef idx="1">
+            <a:schemeClr val="accent1"/>
+          </a:fillRef>
+          <a:effectRef idx="0">
+            <a:schemeClr val="accent1"/>
+          </a:effectRef>
+          <a:fontRef idx="minor">
+            <a:schemeClr val="lt1"/>
+          </a:fontRef>
+        </p:style>
+        <p:txBody>
+          <a:bodyPr rtlCol="0" anchor="ctr"/>
+          <a:lstStyle/>
+          <a:p>
+            <a:pPr algn="ctr"/>
+            <a:endParaRPr lang="en-US"/>
+          </a:p>
+        </p:txBody>
+      </p:sp>
+    </p:spTree>
+    <p:extLst>
+      <p:ext uri="{BB962C8B-B14F-4D97-AF65-F5344CB8AC3E}">
+        <p14:creationId xmlns:p14="http://schemas.microsoft.com/office/powerpoint/2010/main" val="1396956347"/>
+      </p:ext>
+    </p:extLst>
+  </p:cSld>
+  <p:clrMapOvr>
+    <a:masterClrMapping/>
+  </p:clrMapOvr>
+</p:sld>
+</file>
+
+<file path=ppt/slides/slide16.xml><?xml version="1.0" encoding="utf-8"?>
+<p:sld xmlns:a="http://schemas.openxmlformats.org/drawingml/2006/main" xmlns:r="http://schemas.openxmlformats.org/officeDocument/2006/relationships" xmlns:p="http://schemas.openxmlformats.org/presentationml/2006/main">
+  <p:cSld>
+    <p:bg>
+      <p:bgPr>
+        <a:solidFill>
+          <a:schemeClr val="bg1"/>
+        </a:solidFill>
+        <a:effectLst/>
+      </p:bgPr>
+    </p:bg>
+    <p:spTree>
+      <p:nvGrpSpPr>
+        <p:cNvPr id="1" name=""/>
+        <p:cNvGrpSpPr/>
+        <p:nvPr/>
+      </p:nvGrpSpPr>
+      <p:grpSpPr>
+        <a:xfrm>
+          <a:off x="0" y="0"/>
+          <a:ext cx="0" cy="0"/>
+          <a:chOff x="0" y="0"/>
+          <a:chExt cx="0" cy="0"/>
+        </a:xfrm>
+      </p:grpSpPr>
+      <p:sp useBgFill="1">
+        <p:nvSpPr>
+          <p:cNvPr id="8" name="Rectangle 7">
+            <a:extLst>
+              <a:ext uri="{FF2B5EF4-FFF2-40B4-BE49-F238E27FC236}">
+                <a16:creationId xmlns:a16="http://schemas.microsoft.com/office/drawing/2014/main" id="{979E27D9-03C7-44E2-9FF8-15D0C8506AF7}"/>
+              </a:ext>
+              <a:ext uri="{C183D7F6-B498-43B3-948B-1728B52AA6E4}">
+                <adec:decorative xmlns:adec="http://schemas.microsoft.com/office/drawing/2017/decorative" val="1"/>
+              </a:ext>
+            </a:extLst>
+          </p:cNvPr>
+          <p:cNvSpPr>
+            <a:spLocks noGrp="1" noRot="1" noChangeAspect="1" noMove="1" noResize="1" noEditPoints="1" noAdjustHandles="1" noChangeArrowheads="1" noChangeShapeType="1" noTextEdit="1"/>
+          </p:cNvSpPr>
+          <p:nvPr>
+            <p:extLst>
+              <p:ext uri="{386F3935-93C4-4BCD-93E2-E3B085C9AB24}">
+                <p16:designElem xmlns:p16="http://schemas.microsoft.com/office/powerpoint/2015/main" val="1"/>
+              </p:ext>
+            </p:extLst>
+          </p:nvPr>
+        </p:nvSpPr>
+        <p:spPr>
+          <a:xfrm>
+            <a:off x="0" y="0"/>
+            <a:ext cx="12192000" cy="6858000"/>
+          </a:xfrm>
+          <a:prstGeom prst="rect">
+            <a:avLst/>
+          </a:prstGeom>
+          <a:ln w="12700" cap="flat" cmpd="sng" algn="ctr">
+            <a:noFill/>
+            <a:prstDash val="solid"/>
+            <a:miter lim="800000"/>
+          </a:ln>
+          <a:effectLst/>
+          <a:extLst>
+            <a:ext uri="{91240B29-F687-4F45-9708-019B960494DF}">
+              <a14:hiddenLine xmlns:a14="http://schemas.microsoft.com/office/drawing/2010/main" w="12700" cap="flat" cmpd="sng" algn="ctr">
+                <a:solidFill>
+                  <a:schemeClr val="accent1">
+                    <a:shade val="50000"/>
+                  </a:schemeClr>
+                </a:solidFill>
+                <a:prstDash val="solid"/>
+                <a:miter lim="800000"/>
+              </a14:hiddenLine>
+            </a:ext>
+          </a:extLst>
+        </p:spPr>
+        <p:style>
+          <a:lnRef idx="2">
+            <a:schemeClr val="accent1">
+              <a:shade val="50000"/>
+            </a:schemeClr>
+          </a:lnRef>
+          <a:fillRef idx="1">
+            <a:schemeClr val="accent1"/>
+          </a:fillRef>
+          <a:effectRef idx="0">
+            <a:schemeClr val="accent1"/>
+          </a:effectRef>
+          <a:fontRef idx="minor">
+            <a:schemeClr val="lt1"/>
+          </a:fontRef>
+        </p:style>
+        <p:txBody>
+          <a:bodyPr rtlCol="0" anchor="ctr"/>
+          <a:lstStyle/>
+          <a:p>
+            <a:pPr algn="ctr"/>
+            <a:endParaRPr lang="en-US"/>
+          </a:p>
+        </p:txBody>
+      </p:sp>
+      <p:sp>
+        <p:nvSpPr>
+          <p:cNvPr id="2" name="Title 1">
+            <a:extLst>
+              <a:ext uri="{FF2B5EF4-FFF2-40B4-BE49-F238E27FC236}">
                 <a16:creationId xmlns:a16="http://schemas.microsoft.com/office/drawing/2014/main" id="{8B337B21-1E26-A847-AC61-FDA5EEFBFA48}"/>
               </a:ext>
             </a:extLst>
@@ -6523,7 +7479,7 @@
 </p:sld>
 </file>
 
-<file path=ppt/slides/slide15.xml><?xml version="1.0" encoding="utf-8"?>
+<file path=ppt/slides/slide17.xml><?xml version="1.0" encoding="utf-8"?>
 <p:sld xmlns:a="http://schemas.openxmlformats.org/drawingml/2006/main" xmlns:r="http://schemas.openxmlformats.org/officeDocument/2006/relationships" xmlns:p="http://schemas.openxmlformats.org/presentationml/2006/main">
   <p:cSld>
     <p:bg>
@@ -7205,7 +8161,7 @@
 </p:sld>
 </file>
 
-<file path=ppt/slides/slide16.xml><?xml version="1.0" encoding="utf-8"?>
+<file path=ppt/slides/slide18.xml><?xml version="1.0" encoding="utf-8"?>
 <p:sld xmlns:a="http://schemas.openxmlformats.org/drawingml/2006/main" xmlns:r="http://schemas.openxmlformats.org/officeDocument/2006/relationships" xmlns:p="http://schemas.openxmlformats.org/presentationml/2006/main">
   <p:cSld>
     <p:bg>
@@ -7754,7 +8710,7 @@
 </p:sld>
 </file>
 
-<file path=ppt/slides/slide17.xml><?xml version="1.0" encoding="utf-8"?>
+<file path=ppt/slides/slide19.xml><?xml version="1.0" encoding="utf-8"?>
 <p:sld xmlns:a="http://schemas.openxmlformats.org/drawingml/2006/main" xmlns:r="http://schemas.openxmlformats.org/officeDocument/2006/relationships" xmlns:p="http://schemas.openxmlformats.org/presentationml/2006/main">
   <p:cSld>
     <p:bg>

</xml_diff>